<commit_message>
Web app was finished
</commit_message>
<xml_diff>
--- a/presentation.pptx
+++ b/presentation.pptx
@@ -11,12 +11,12 @@
     <p:sldId id="256" r:id="rId2"/>
     <p:sldId id="257" r:id="rId3"/>
     <p:sldId id="258" r:id="rId4"/>
-    <p:sldId id="259" r:id="rId5"/>
-    <p:sldId id="260" r:id="rId6"/>
-    <p:sldId id="261" r:id="rId7"/>
-    <p:sldId id="262" r:id="rId8"/>
-    <p:sldId id="263" r:id="rId9"/>
-    <p:sldId id="264" r:id="rId10"/>
+    <p:sldId id="260" r:id="rId5"/>
+    <p:sldId id="261" r:id="rId6"/>
+    <p:sldId id="262" r:id="rId7"/>
+    <p:sldId id="263" r:id="rId8"/>
+    <p:sldId id="268" r:id="rId9"/>
+    <p:sldId id="272" r:id="rId10"/>
     <p:sldId id="265" r:id="rId11"/>
     <p:sldId id="266" r:id="rId12"/>
   </p:sldIdLst>
@@ -117,6 +117,11 @@
       </a:defRPr>
     </a:lvl9pPr>
   </p:defaultTextStyle>
+  <p:extLst>
+    <p:ext uri="{EFAFB233-063F-42B5-8137-9DF3F51BA10A}">
+      <p15:sldGuideLst xmlns:p15="http://schemas.microsoft.com/office/powerpoint/2012/main"/>
+    </p:ext>
+  </p:extLst>
 </p:presentation>
 </file>
 
@@ -202,7 +207,7 @@
           <a:p>
             <a:fld id="{E99829B5-B496-47BD-A63F-2BB67EE494F9}" type="datetimeFigureOut">
               <a:rPr lang="uk-UA" smtClean="0"/>
-              <a:t>13.06.2023</a:t>
+              <a:t>15.06.2023</a:t>
             </a:fld>
             <a:endParaRPr lang="uk-UA"/>
           </a:p>
@@ -616,7 +621,7 @@
           <a:p>
             <a:fld id="{06AD9E31-3101-4242-A32A-6903EB3B7486}" type="datetime1">
               <a:rPr lang="uk-UA" smtClean="0"/>
-              <a:t>13.06.2023</a:t>
+              <a:t>15.06.2023</a:t>
             </a:fld>
             <a:endParaRPr lang="uk-UA"/>
           </a:p>
@@ -814,7 +819,7 @@
           <a:p>
             <a:fld id="{A893A523-5355-4C06-8FA9-A7DBDCE18431}" type="datetime1">
               <a:rPr lang="uk-UA" smtClean="0"/>
-              <a:t>13.06.2023</a:t>
+              <a:t>15.06.2023</a:t>
             </a:fld>
             <a:endParaRPr lang="uk-UA"/>
           </a:p>
@@ -1022,7 +1027,7 @@
           <a:p>
             <a:fld id="{7F43DDD4-3535-488D-B357-14DBEBF88DD3}" type="datetime1">
               <a:rPr lang="uk-UA" smtClean="0"/>
-              <a:t>13.06.2023</a:t>
+              <a:t>15.06.2023</a:t>
             </a:fld>
             <a:endParaRPr lang="uk-UA"/>
           </a:p>
@@ -1220,7 +1225,7 @@
           <a:p>
             <a:fld id="{F3463DEC-9466-49F4-A856-88D721A82CC6}" type="datetime1">
               <a:rPr lang="uk-UA" smtClean="0"/>
-              <a:t>13.06.2023</a:t>
+              <a:t>15.06.2023</a:t>
             </a:fld>
             <a:endParaRPr lang="uk-UA"/>
           </a:p>
@@ -1495,7 +1500,7 @@
           <a:p>
             <a:fld id="{1DA608BA-3D0E-45DF-A73A-8C2A5CE3B320}" type="datetime1">
               <a:rPr lang="uk-UA" smtClean="0"/>
-              <a:t>13.06.2023</a:t>
+              <a:t>15.06.2023</a:t>
             </a:fld>
             <a:endParaRPr lang="uk-UA"/>
           </a:p>
@@ -1760,7 +1765,7 @@
           <a:p>
             <a:fld id="{1C8E3497-49DB-4B6B-9681-18F0B2222C18}" type="datetime1">
               <a:rPr lang="uk-UA" smtClean="0"/>
-              <a:t>13.06.2023</a:t>
+              <a:t>15.06.2023</a:t>
             </a:fld>
             <a:endParaRPr lang="uk-UA"/>
           </a:p>
@@ -2172,7 +2177,7 @@
           <a:p>
             <a:fld id="{D9049D09-0429-4EC2-8553-31A6827BD7AC}" type="datetime1">
               <a:rPr lang="uk-UA" smtClean="0"/>
-              <a:t>13.06.2023</a:t>
+              <a:t>15.06.2023</a:t>
             </a:fld>
             <a:endParaRPr lang="uk-UA"/>
           </a:p>
@@ -2313,7 +2318,7 @@
           <a:p>
             <a:fld id="{D42CDC31-5FFB-42AE-8EC0-2AD5B1820AE5}" type="datetime1">
               <a:rPr lang="uk-UA" smtClean="0"/>
-              <a:t>13.06.2023</a:t>
+              <a:t>15.06.2023</a:t>
             </a:fld>
             <a:endParaRPr lang="uk-UA"/>
           </a:p>
@@ -2426,7 +2431,7 @@
           <a:p>
             <a:fld id="{0C187983-C3FD-4B4D-A1E4-9CDD5D505C32}" type="datetime1">
               <a:rPr lang="uk-UA" smtClean="0"/>
-              <a:t>13.06.2023</a:t>
+              <a:t>15.06.2023</a:t>
             </a:fld>
             <a:endParaRPr lang="uk-UA"/>
           </a:p>
@@ -2737,7 +2742,7 @@
           <a:p>
             <a:fld id="{3C1D674F-EEFA-44DD-A5B5-E34F1AF9C767}" type="datetime1">
               <a:rPr lang="uk-UA" smtClean="0"/>
-              <a:t>13.06.2023</a:t>
+              <a:t>15.06.2023</a:t>
             </a:fld>
             <a:endParaRPr lang="uk-UA"/>
           </a:p>
@@ -3025,7 +3030,7 @@
           <a:p>
             <a:fld id="{4A4327F2-9B2A-4484-A54E-0F91C39668E8}" type="datetime1">
               <a:rPr lang="uk-UA" smtClean="0"/>
-              <a:t>13.06.2023</a:t>
+              <a:t>15.06.2023</a:t>
             </a:fld>
             <a:endParaRPr lang="uk-UA"/>
           </a:p>
@@ -3266,7 +3271,7 @@
           <a:p>
             <a:fld id="{47BED82E-BBA7-40B0-A81E-7E247BC16A10}" type="datetime1">
               <a:rPr lang="uk-UA" smtClean="0"/>
-              <a:t>13.06.2023</a:t>
+              <a:t>15.06.2023</a:t>
             </a:fld>
             <a:endParaRPr lang="uk-UA"/>
           </a:p>
@@ -4103,23 +4108,7 @@
             </a:pPr>
             <a:r>
               <a:rPr lang="ru-RU" dirty="0"/>
-              <a:t>исследовано время выполнения запроса без индекса, с </a:t>
-            </a:r>
-            <a:r>
-              <a:rPr lang="ru-RU" dirty="0" err="1"/>
-              <a:t>кластеризованным</a:t>
-            </a:r>
-            <a:r>
-              <a:rPr lang="ru-RU" dirty="0"/>
-              <a:t> и </a:t>
-            </a:r>
-            <a:r>
-              <a:rPr lang="ru-RU" dirty="0" err="1"/>
-              <a:t>некластеризованным</a:t>
-            </a:r>
-            <a:r>
-              <a:rPr lang="ru-RU" dirty="0"/>
-              <a:t> индексом.</a:t>
+              <a:t>исследованы характеристики разработанного программного обеспечения.</a:t>
             </a:r>
             <a:endParaRPr lang="uk-UA" dirty="0"/>
           </a:p>
@@ -4414,23 +4403,11 @@
             </a:pPr>
             <a:r>
               <a:rPr lang="ru-RU" dirty="0"/>
-              <a:t>исследовать время выполнения запроса без индекса, с </a:t>
-            </a:r>
-            <a:r>
-              <a:rPr lang="ru-RU" dirty="0" err="1"/>
-              <a:t>кластеризованным</a:t>
-            </a:r>
-            <a:r>
-              <a:rPr lang="ru-RU" dirty="0"/>
-              <a:t> и </a:t>
-            </a:r>
-            <a:r>
-              <a:rPr lang="ru-RU" dirty="0" err="1"/>
-              <a:t>некластеризованным</a:t>
-            </a:r>
-            <a:r>
-              <a:rPr lang="ru-RU" dirty="0"/>
-              <a:t> индексом.</a:t>
+              <a:t>исследовать характеристики разработанного программного обеспечения</a:t>
+            </a:r>
+            <a:r>
+              <a:rPr lang="en-US" dirty="0"/>
+              <a:t>.</a:t>
             </a:r>
             <a:endParaRPr lang="uk-UA" dirty="0"/>
           </a:p>
@@ -4524,52 +4501,6 @@
           </a:p>
         </p:txBody>
       </p:sp>
-      <p:sp>
-        <p:nvSpPr>
-          <p:cNvPr id="3" name="Місце для вмісту 2">
-            <a:extLst>
-              <a:ext uri="{FF2B5EF4-FFF2-40B4-BE49-F238E27FC236}">
-                <a16:creationId xmlns:a16="http://schemas.microsoft.com/office/drawing/2014/main" id="{E1E91019-0BB5-4C94-85C5-28DEA79FBFBD}"/>
-              </a:ext>
-            </a:extLst>
-          </p:cNvPr>
-          <p:cNvSpPr>
-            <a:spLocks noGrp="1"/>
-          </p:cNvSpPr>
-          <p:nvPr>
-            <p:ph idx="1"/>
-          </p:nvPr>
-        </p:nvSpPr>
-        <p:spPr>
-          <a:xfrm>
-            <a:off x="838200" y="1825625"/>
-            <a:ext cx="3458592" cy="4351338"/>
-          </a:xfrm>
-        </p:spPr>
-        <p:txBody>
-          <a:bodyPr/>
-          <a:lstStyle/>
-          <a:p>
-            <a:r>
-              <a:rPr lang="en-US" dirty="0"/>
-              <a:t>Qatar Airways</a:t>
-            </a:r>
-          </a:p>
-          <a:p>
-            <a:r>
-              <a:rPr lang="en-US" dirty="0"/>
-              <a:t>Emirates</a:t>
-            </a:r>
-          </a:p>
-          <a:p>
-            <a:r>
-              <a:rPr lang="en-US" dirty="0"/>
-              <a:t>United Airlines</a:t>
-            </a:r>
-            <a:endParaRPr lang="uk-UA" dirty="0"/>
-          </a:p>
-        </p:txBody>
-      </p:sp>
       <p:pic>
         <p:nvPicPr>
           <p:cNvPr id="5" name="Рисунок 4">
@@ -4598,26 +4529,12 @@
         </p:blipFill>
         <p:spPr>
           <a:xfrm>
-            <a:off x="4718460" y="1825625"/>
-            <a:ext cx="6635340" cy="4530787"/>
+            <a:off x="1592804" y="1436646"/>
+            <a:ext cx="3378971" cy="2307252"/>
           </a:xfrm>
           <a:prstGeom prst="rect">
             <a:avLst/>
           </a:prstGeom>
-          <a:ln w="38100" cap="sq">
-            <a:solidFill>
-              <a:srgbClr val="000000"/>
-            </a:solidFill>
-            <a:prstDash val="solid"/>
-            <a:miter lim="800000"/>
-          </a:ln>
-          <a:effectLst>
-            <a:outerShdw blurRad="50800" dist="38100" dir="2700000" algn="tl" rotWithShape="0">
-              <a:srgbClr val="000000">
-                <a:alpha val="43000"/>
-              </a:srgbClr>
-            </a:outerShdw>
-          </a:effectLst>
         </p:spPr>
       </p:pic>
       <p:sp>
@@ -4646,6 +4563,186 @@
               <a:t>3</a:t>
             </a:fld>
             <a:endParaRPr lang="uk-UA"/>
+          </a:p>
+        </p:txBody>
+      </p:sp>
+      <p:pic>
+        <p:nvPicPr>
+          <p:cNvPr id="7" name="Рисунок 6">
+            <a:extLst>
+              <a:ext uri="{FF2B5EF4-FFF2-40B4-BE49-F238E27FC236}">
+                <a16:creationId xmlns:a16="http://schemas.microsoft.com/office/drawing/2014/main" id="{0990FDAB-2B5D-45B6-B52C-98EEB4DCE9A3}"/>
+              </a:ext>
+            </a:extLst>
+          </p:cNvPr>
+          <p:cNvPicPr>
+            <a:picLocks noChangeAspect="1"/>
+          </p:cNvPicPr>
+          <p:nvPr/>
+        </p:nvPicPr>
+        <p:blipFill>
+          <a:blip r:embed="rId3">
+            <a:extLst>
+              <a:ext uri="{28A0092B-C50C-407E-A947-70E740481C1C}">
+                <a14:useLocalDpi xmlns:a14="http://schemas.microsoft.com/office/drawing/2010/main" val="0"/>
+              </a:ext>
+            </a:extLst>
+          </a:blip>
+          <a:stretch>
+            <a:fillRect/>
+          </a:stretch>
+        </p:blipFill>
+        <p:spPr>
+          <a:xfrm>
+            <a:off x="6642912" y="2680277"/>
+            <a:ext cx="3935375" cy="2063636"/>
+          </a:xfrm>
+          <a:prstGeom prst="rect">
+            <a:avLst/>
+          </a:prstGeom>
+        </p:spPr>
+      </p:pic>
+      <p:pic>
+        <p:nvPicPr>
+          <p:cNvPr id="8" name="Рисунок 7">
+            <a:extLst>
+              <a:ext uri="{FF2B5EF4-FFF2-40B4-BE49-F238E27FC236}">
+                <a16:creationId xmlns:a16="http://schemas.microsoft.com/office/drawing/2014/main" id="{AB906C2D-8866-4667-8811-7004AB02D018}"/>
+              </a:ext>
+            </a:extLst>
+          </p:cNvPr>
+          <p:cNvPicPr>
+            <a:picLocks noChangeAspect="1"/>
+          </p:cNvPicPr>
+          <p:nvPr/>
+        </p:nvPicPr>
+        <p:blipFill>
+          <a:blip r:embed="rId4">
+            <a:extLst>
+              <a:ext uri="{28A0092B-C50C-407E-A947-70E740481C1C}">
+                <a14:useLocalDpi xmlns:a14="http://schemas.microsoft.com/office/drawing/2010/main" val="0"/>
+              </a:ext>
+            </a:extLst>
+          </a:blip>
+          <a:stretch>
+            <a:fillRect/>
+          </a:stretch>
+        </p:blipFill>
+        <p:spPr>
+          <a:xfrm>
+            <a:off x="1582976" y="4116936"/>
+            <a:ext cx="3412079" cy="2228233"/>
+          </a:xfrm>
+          <a:prstGeom prst="rect">
+            <a:avLst/>
+          </a:prstGeom>
+        </p:spPr>
+      </p:pic>
+      <p:sp>
+        <p:nvSpPr>
+          <p:cNvPr id="4" name="TextBox 3">
+            <a:extLst>
+              <a:ext uri="{FF2B5EF4-FFF2-40B4-BE49-F238E27FC236}">
+                <a16:creationId xmlns:a16="http://schemas.microsoft.com/office/drawing/2014/main" id="{084D2A91-44A9-4FD3-A8CF-315CF308F334}"/>
+              </a:ext>
+            </a:extLst>
+          </p:cNvPr>
+          <p:cNvSpPr txBox="1"/>
+          <p:nvPr/>
+        </p:nvSpPr>
+        <p:spPr>
+          <a:xfrm>
+            <a:off x="2535065" y="3712095"/>
+            <a:ext cx="1494448" cy="369332"/>
+          </a:xfrm>
+          <a:prstGeom prst="rect">
+            <a:avLst/>
+          </a:prstGeom>
+          <a:noFill/>
+        </p:spPr>
+        <p:txBody>
+          <a:bodyPr wrap="none" rtlCol="0">
+            <a:spAutoFit/>
+          </a:bodyPr>
+          <a:lstStyle/>
+          <a:p>
+            <a:r>
+              <a:rPr lang="en-US" dirty="0"/>
+              <a:t>Qatar Airways</a:t>
+            </a:r>
+            <a:endParaRPr lang="uk-UA" dirty="0"/>
+          </a:p>
+        </p:txBody>
+      </p:sp>
+      <p:sp>
+        <p:nvSpPr>
+          <p:cNvPr id="11" name="TextBox 10">
+            <a:extLst>
+              <a:ext uri="{FF2B5EF4-FFF2-40B4-BE49-F238E27FC236}">
+                <a16:creationId xmlns:a16="http://schemas.microsoft.com/office/drawing/2014/main" id="{6E0E9E59-0D36-4B6C-A080-326242E41CCB}"/>
+              </a:ext>
+            </a:extLst>
+          </p:cNvPr>
+          <p:cNvSpPr txBox="1"/>
+          <p:nvPr/>
+        </p:nvSpPr>
+        <p:spPr>
+          <a:xfrm>
+            <a:off x="2790192" y="6345169"/>
+            <a:ext cx="997645" cy="369332"/>
+          </a:xfrm>
+          <a:prstGeom prst="rect">
+            <a:avLst/>
+          </a:prstGeom>
+          <a:noFill/>
+        </p:spPr>
+        <p:txBody>
+          <a:bodyPr wrap="none" rtlCol="0">
+            <a:spAutoFit/>
+          </a:bodyPr>
+          <a:lstStyle/>
+          <a:p>
+            <a:r>
+              <a:rPr lang="en-US" dirty="0"/>
+              <a:t>Emirates</a:t>
+            </a:r>
+            <a:endParaRPr lang="uk-UA" dirty="0"/>
+          </a:p>
+        </p:txBody>
+      </p:sp>
+      <p:sp>
+        <p:nvSpPr>
+          <p:cNvPr id="12" name="TextBox 11">
+            <a:extLst>
+              <a:ext uri="{FF2B5EF4-FFF2-40B4-BE49-F238E27FC236}">
+                <a16:creationId xmlns:a16="http://schemas.microsoft.com/office/drawing/2014/main" id="{B9FEF65D-033F-4CBA-B522-DD410F7C4FF7}"/>
+              </a:ext>
+            </a:extLst>
+          </p:cNvPr>
+          <p:cNvSpPr txBox="1"/>
+          <p:nvPr/>
+        </p:nvSpPr>
+        <p:spPr>
+          <a:xfrm>
+            <a:off x="7825416" y="4789530"/>
+            <a:ext cx="1570366" cy="369332"/>
+          </a:xfrm>
+          <a:prstGeom prst="rect">
+            <a:avLst/>
+          </a:prstGeom>
+          <a:noFill/>
+        </p:spPr>
+        <p:txBody>
+          <a:bodyPr wrap="none" rtlCol="0">
+            <a:spAutoFit/>
+          </a:bodyPr>
+          <a:lstStyle/>
+          <a:p>
+            <a:r>
+              <a:rPr lang="en-US" dirty="0"/>
+              <a:t>United Airlines</a:t>
+            </a:r>
+            <a:endParaRPr lang="uk-UA" dirty="0"/>
           </a:p>
         </p:txBody>
       </p:sp>
@@ -4684,7 +4781,7 @@
           <p:cNvPr id="2" name="Заголовок 1">
             <a:extLst>
               <a:ext uri="{FF2B5EF4-FFF2-40B4-BE49-F238E27FC236}">
-                <a16:creationId xmlns:a16="http://schemas.microsoft.com/office/drawing/2014/main" id="{C8E52A6E-83A0-4B14-9838-ACEE60635E46}"/>
+                <a16:creationId xmlns:a16="http://schemas.microsoft.com/office/drawing/2014/main" id="{AA78D46A-68A7-4898-92BD-422F467A1F62}"/>
               </a:ext>
             </a:extLst>
           </p:cNvPr>
@@ -4701,19 +4798,55 @@
           <a:lstStyle/>
           <a:p>
             <a:r>
+              <a:rPr lang="en-US" dirty="0"/>
+              <a:t>ER-</a:t>
+            </a:r>
+            <a:r>
+              <a:rPr lang="uk-UA" dirty="0"/>
+              <a:t>модель </a:t>
+            </a:r>
+            <a:r>
               <a:rPr lang="ru-RU" dirty="0"/>
-              <a:t>Существующие аналоги</a:t>
-            </a:r>
-            <a:endParaRPr lang="uk-UA" dirty="0"/>
+              <a:t>разработанной базы данных</a:t>
+            </a:r>
+          </a:p>
+        </p:txBody>
+      </p:sp>
+      <p:sp>
+        <p:nvSpPr>
+          <p:cNvPr id="8" name="Місце для номера слайда 7">
+            <a:extLst>
+              <a:ext uri="{FF2B5EF4-FFF2-40B4-BE49-F238E27FC236}">
+                <a16:creationId xmlns:a16="http://schemas.microsoft.com/office/drawing/2014/main" id="{55E2577D-AD02-4D03-BCF2-F953CC6D2931}"/>
+              </a:ext>
+            </a:extLst>
+          </p:cNvPr>
+          <p:cNvSpPr>
+            <a:spLocks noGrp="1"/>
+          </p:cNvSpPr>
+          <p:nvPr>
+            <p:ph type="sldNum" sz="quarter" idx="12"/>
+          </p:nvPr>
+        </p:nvSpPr>
+        <p:spPr/>
+        <p:txBody>
+          <a:bodyPr/>
+          <a:lstStyle/>
+          <a:p>
+            <a:fld id="{D31A221B-4647-4E94-AF60-E3C99F60198D}" type="slidenum">
+              <a:rPr lang="uk-UA" smtClean="0"/>
+              <a:t>4</a:t>
+            </a:fld>
+            <a:endParaRPr lang="uk-UA"/>
           </a:p>
         </p:txBody>
       </p:sp>
       <p:pic>
         <p:nvPicPr>
-          <p:cNvPr id="5" name="Рисунок 4">
-            <a:extLst>
-              <a:ext uri="{FF2B5EF4-FFF2-40B4-BE49-F238E27FC236}">
-                <a16:creationId xmlns:a16="http://schemas.microsoft.com/office/drawing/2014/main" id="{3AEFDAF6-FC1C-445A-A122-44425479EA9B}"/>
+          <p:cNvPr id="10" name="Рисунок 9">
+            <a:extLst>
+              <a:ext uri="{FF2B5EF4-FFF2-40B4-BE49-F238E27FC236}">
+                <a16:creationId xmlns:a16="http://schemas.microsoft.com/office/drawing/2014/main" id="{52B10CDB-5AF7-46DB-AD65-C7E009F00016}"/>
               </a:ext>
             </a:extLst>
           </p:cNvPr>
@@ -4736,111 +4869,18 @@
         </p:blipFill>
         <p:spPr>
           <a:xfrm>
-            <a:off x="5761644" y="1737296"/>
-            <a:ext cx="6066371" cy="3181090"/>
+            <a:off x="1291701" y="1366731"/>
+            <a:ext cx="9608598" cy="5313576"/>
           </a:xfrm>
           <a:prstGeom prst="rect">
             <a:avLst/>
           </a:prstGeom>
-          <a:ln w="38100" cap="sq">
-            <a:solidFill>
-              <a:srgbClr val="000000"/>
-            </a:solidFill>
-            <a:prstDash val="solid"/>
-            <a:miter lim="800000"/>
-          </a:ln>
-          <a:effectLst>
-            <a:outerShdw blurRad="50800" dist="38100" dir="2700000" algn="tl" rotWithShape="0">
-              <a:srgbClr val="000000">
-                <a:alpha val="43000"/>
-              </a:srgbClr>
-            </a:outerShdw>
-          </a:effectLst>
         </p:spPr>
       </p:pic>
-      <p:pic>
-        <p:nvPicPr>
-          <p:cNvPr id="7" name="Рисунок 6">
-            <a:extLst>
-              <a:ext uri="{FF2B5EF4-FFF2-40B4-BE49-F238E27FC236}">
-                <a16:creationId xmlns:a16="http://schemas.microsoft.com/office/drawing/2014/main" id="{1D66A097-401B-40D1-9418-3A680E00E755}"/>
-              </a:ext>
-            </a:extLst>
-          </p:cNvPr>
-          <p:cNvPicPr>
-            <a:picLocks noChangeAspect="1"/>
-          </p:cNvPicPr>
-          <p:nvPr/>
-        </p:nvPicPr>
-        <p:blipFill>
-          <a:blip r:embed="rId3">
-            <a:extLst>
-              <a:ext uri="{28A0092B-C50C-407E-A947-70E740481C1C}">
-                <a14:useLocalDpi xmlns:a14="http://schemas.microsoft.com/office/drawing/2010/main" val="0"/>
-              </a:ext>
-            </a:extLst>
-          </a:blip>
-          <a:stretch>
-            <a:fillRect/>
-          </a:stretch>
-        </p:blipFill>
-        <p:spPr>
-          <a:xfrm>
-            <a:off x="363985" y="2812868"/>
-            <a:ext cx="5112451" cy="3338649"/>
-          </a:xfrm>
-          <a:prstGeom prst="rect">
-            <a:avLst/>
-          </a:prstGeom>
-          <a:ln w="38100" cap="sq">
-            <a:solidFill>
-              <a:srgbClr val="000000"/>
-            </a:solidFill>
-            <a:prstDash val="solid"/>
-            <a:miter lim="800000"/>
-          </a:ln>
-          <a:effectLst>
-            <a:outerShdw blurRad="50800" dist="38100" dir="2700000" algn="tl" rotWithShape="0">
-              <a:srgbClr val="000000">
-                <a:alpha val="43000"/>
-              </a:srgbClr>
-            </a:outerShdw>
-          </a:effectLst>
-        </p:spPr>
-      </p:pic>
-      <p:sp>
-        <p:nvSpPr>
-          <p:cNvPr id="8" name="Місце для номера слайда 7">
-            <a:extLst>
-              <a:ext uri="{FF2B5EF4-FFF2-40B4-BE49-F238E27FC236}">
-                <a16:creationId xmlns:a16="http://schemas.microsoft.com/office/drawing/2014/main" id="{72ED1E52-05D2-4AA4-8CD4-6B887B011C62}"/>
-              </a:ext>
-            </a:extLst>
-          </p:cNvPr>
-          <p:cNvSpPr>
-            <a:spLocks noGrp="1"/>
-          </p:cNvSpPr>
-          <p:nvPr>
-            <p:ph type="sldNum" sz="quarter" idx="12"/>
-          </p:nvPr>
-        </p:nvSpPr>
-        <p:spPr/>
-        <p:txBody>
-          <a:bodyPr/>
-          <a:lstStyle/>
-          <a:p>
-            <a:fld id="{D31A221B-4647-4E94-AF60-E3C99F60198D}" type="slidenum">
-              <a:rPr lang="uk-UA" smtClean="0"/>
-              <a:t>4</a:t>
-            </a:fld>
-            <a:endParaRPr lang="uk-UA"/>
-          </a:p>
-        </p:txBody>
-      </p:sp>
     </p:spTree>
     <p:extLst>
       <p:ext uri="{BB962C8B-B14F-4D97-AF65-F5344CB8AC3E}">
-        <p14:creationId xmlns:p14="http://schemas.microsoft.com/office/powerpoint/2010/main" val="474600620"/>
+        <p14:creationId xmlns:p14="http://schemas.microsoft.com/office/powerpoint/2010/main" val="3596995398"/>
       </p:ext>
     </p:extLst>
   </p:cSld>
@@ -4872,7 +4912,7 @@
           <p:cNvPr id="2" name="Заголовок 1">
             <a:extLst>
               <a:ext uri="{FF2B5EF4-FFF2-40B4-BE49-F238E27FC236}">
-                <a16:creationId xmlns:a16="http://schemas.microsoft.com/office/drawing/2014/main" id="{AA78D46A-68A7-4898-92BD-422F467A1F62}"/>
+                <a16:creationId xmlns:a16="http://schemas.microsoft.com/office/drawing/2014/main" id="{82EE2B3B-E23E-49F6-B3DD-D711205E0D3F}"/>
               </a:ext>
             </a:extLst>
           </p:cNvPr>
@@ -4889,26 +4929,18 @@
           <a:lstStyle/>
           <a:p>
             <a:r>
-              <a:rPr lang="en-US" dirty="0"/>
-              <a:t>ER-</a:t>
-            </a:r>
-            <a:r>
-              <a:rPr lang="uk-UA" dirty="0"/>
-              <a:t>модель </a:t>
-            </a:r>
-            <a:r>
               <a:rPr lang="ru-RU" dirty="0"/>
-              <a:t>разработанной базы данных</a:t>
+              <a:t>Диаграммы вариантов использования</a:t>
             </a:r>
           </a:p>
         </p:txBody>
       </p:sp>
       <p:pic>
         <p:nvPicPr>
-          <p:cNvPr id="7" name="Рисунок 6">
-            <a:extLst>
-              <a:ext uri="{FF2B5EF4-FFF2-40B4-BE49-F238E27FC236}">
-                <a16:creationId xmlns:a16="http://schemas.microsoft.com/office/drawing/2014/main" id="{FC0A8080-DC50-4D94-B913-A5CF9F034822}"/>
+          <p:cNvPr id="5" name="Рисунок 4">
+            <a:extLst>
+              <a:ext uri="{FF2B5EF4-FFF2-40B4-BE49-F238E27FC236}">
+                <a16:creationId xmlns:a16="http://schemas.microsoft.com/office/drawing/2014/main" id="{2D70EB5D-A46D-4D28-A148-57BA36563B5B}"/>
               </a:ext>
             </a:extLst>
           </p:cNvPr>
@@ -4931,20 +4963,56 @@
         </p:blipFill>
         <p:spPr>
           <a:xfrm>
-            <a:off x="3710604" y="1447060"/>
-            <a:ext cx="4770791" cy="5295529"/>
+            <a:off x="1135695" y="2537670"/>
+            <a:ext cx="4013354" cy="2358041"/>
           </a:xfrm>
           <a:prstGeom prst="rect">
             <a:avLst/>
           </a:prstGeom>
         </p:spPr>
       </p:pic>
+      <p:pic>
+        <p:nvPicPr>
+          <p:cNvPr id="7" name="Рисунок 6">
+            <a:extLst>
+              <a:ext uri="{FF2B5EF4-FFF2-40B4-BE49-F238E27FC236}">
+                <a16:creationId xmlns:a16="http://schemas.microsoft.com/office/drawing/2014/main" id="{AB4BFEA3-86C5-49AE-93B0-3B160020AC83}"/>
+              </a:ext>
+            </a:extLst>
+          </p:cNvPr>
+          <p:cNvPicPr>
+            <a:picLocks noChangeAspect="1"/>
+          </p:cNvPicPr>
+          <p:nvPr/>
+        </p:nvPicPr>
+        <p:blipFill>
+          <a:blip r:embed="rId3">
+            <a:extLst>
+              <a:ext uri="{28A0092B-C50C-407E-A947-70E740481C1C}">
+                <a14:useLocalDpi xmlns:a14="http://schemas.microsoft.com/office/drawing/2010/main" val="0"/>
+              </a:ext>
+            </a:extLst>
+          </a:blip>
+          <a:stretch>
+            <a:fillRect/>
+          </a:stretch>
+        </p:blipFill>
+        <p:spPr>
+          <a:xfrm>
+            <a:off x="6280964" y="1690688"/>
+            <a:ext cx="4091764" cy="4780903"/>
+          </a:xfrm>
+          <a:prstGeom prst="rect">
+            <a:avLst/>
+          </a:prstGeom>
+        </p:spPr>
+      </p:pic>
       <p:sp>
         <p:nvSpPr>
           <p:cNvPr id="8" name="Місце для номера слайда 7">
             <a:extLst>
               <a:ext uri="{FF2B5EF4-FFF2-40B4-BE49-F238E27FC236}">
-                <a16:creationId xmlns:a16="http://schemas.microsoft.com/office/drawing/2014/main" id="{55E2577D-AD02-4D03-BCF2-F953CC6D2931}"/>
+                <a16:creationId xmlns:a16="http://schemas.microsoft.com/office/drawing/2014/main" id="{CD33E24F-3CE4-464B-819D-51C828515FEB}"/>
               </a:ext>
             </a:extLst>
           </p:cNvPr>
@@ -4971,7 +5039,7 @@
     </p:spTree>
     <p:extLst>
       <p:ext uri="{BB962C8B-B14F-4D97-AF65-F5344CB8AC3E}">
-        <p14:creationId xmlns:p14="http://schemas.microsoft.com/office/powerpoint/2010/main" val="3596995398"/>
+        <p14:creationId xmlns:p14="http://schemas.microsoft.com/office/powerpoint/2010/main" val="2341341781"/>
       </p:ext>
     </p:extLst>
   </p:cSld>
@@ -5028,10 +5096,10 @@
       </p:sp>
       <p:pic>
         <p:nvPicPr>
-          <p:cNvPr id="5" name="Рисунок 4">
-            <a:extLst>
-              <a:ext uri="{FF2B5EF4-FFF2-40B4-BE49-F238E27FC236}">
-                <a16:creationId xmlns:a16="http://schemas.microsoft.com/office/drawing/2014/main" id="{2D70EB5D-A46D-4D28-A148-57BA36563B5B}"/>
+          <p:cNvPr id="4" name="Рисунок 3">
+            <a:extLst>
+              <a:ext uri="{FF2B5EF4-FFF2-40B4-BE49-F238E27FC236}">
+                <a16:creationId xmlns:a16="http://schemas.microsoft.com/office/drawing/2014/main" id="{526B41CE-D384-42E6-947D-95B5D1D712E9}"/>
               </a:ext>
             </a:extLst>
           </p:cNvPr>
@@ -5054,8 +5122,8 @@
         </p:blipFill>
         <p:spPr>
           <a:xfrm>
-            <a:off x="949263" y="2537670"/>
-            <a:ext cx="4013354" cy="2358041"/>
+            <a:off x="6546079" y="2323092"/>
+            <a:ext cx="4933772" cy="3135149"/>
           </a:xfrm>
           <a:prstGeom prst="rect">
             <a:avLst/>
@@ -5064,10 +5132,10 @@
       </p:pic>
       <p:pic>
         <p:nvPicPr>
-          <p:cNvPr id="7" name="Рисунок 6">
-            <a:extLst>
-              <a:ext uri="{FF2B5EF4-FFF2-40B4-BE49-F238E27FC236}">
-                <a16:creationId xmlns:a16="http://schemas.microsoft.com/office/drawing/2014/main" id="{AB4BFEA3-86C5-49AE-93B0-3B160020AC83}"/>
+          <p:cNvPr id="8" name="Рисунок 7">
+            <a:extLst>
+              <a:ext uri="{FF2B5EF4-FFF2-40B4-BE49-F238E27FC236}">
+                <a16:creationId xmlns:a16="http://schemas.microsoft.com/office/drawing/2014/main" id="{89E59EEE-1373-464F-BDFE-F010B1EC178F}"/>
               </a:ext>
             </a:extLst>
           </p:cNvPr>
@@ -5090,8 +5158,8 @@
         </p:blipFill>
         <p:spPr>
           <a:xfrm>
-            <a:off x="7150973" y="1690688"/>
-            <a:ext cx="4091764" cy="4780903"/>
+            <a:off x="719260" y="2387075"/>
+            <a:ext cx="4926662" cy="3071166"/>
           </a:xfrm>
           <a:prstGeom prst="rect">
             <a:avLst/>
@@ -5100,10 +5168,10 @@
       </p:pic>
       <p:sp>
         <p:nvSpPr>
-          <p:cNvPr id="8" name="Місце для номера слайда 7">
-            <a:extLst>
-              <a:ext uri="{FF2B5EF4-FFF2-40B4-BE49-F238E27FC236}">
-                <a16:creationId xmlns:a16="http://schemas.microsoft.com/office/drawing/2014/main" id="{CD33E24F-3CE4-464B-819D-51C828515FEB}"/>
+          <p:cNvPr id="9" name="Місце для номера слайда 8">
+            <a:extLst>
+              <a:ext uri="{FF2B5EF4-FFF2-40B4-BE49-F238E27FC236}">
+                <a16:creationId xmlns:a16="http://schemas.microsoft.com/office/drawing/2014/main" id="{44175B42-81AF-4E41-992E-D7FB431CFB8A}"/>
               </a:ext>
             </a:extLst>
           </p:cNvPr>
@@ -5130,7 +5198,7 @@
     </p:spTree>
     <p:extLst>
       <p:ext uri="{BB962C8B-B14F-4D97-AF65-F5344CB8AC3E}">
-        <p14:creationId xmlns:p14="http://schemas.microsoft.com/office/powerpoint/2010/main" val="2341341781"/>
+        <p14:creationId xmlns:p14="http://schemas.microsoft.com/office/powerpoint/2010/main" val="282871565"/>
       </p:ext>
     </p:extLst>
   </p:cSld>
@@ -5162,7 +5230,7 @@
           <p:cNvPr id="2" name="Заголовок 1">
             <a:extLst>
               <a:ext uri="{FF2B5EF4-FFF2-40B4-BE49-F238E27FC236}">
-                <a16:creationId xmlns:a16="http://schemas.microsoft.com/office/drawing/2014/main" id="{82EE2B3B-E23E-49F6-B3DD-D711205E0D3F}"/>
+                <a16:creationId xmlns:a16="http://schemas.microsoft.com/office/drawing/2014/main" id="{71E503F7-A453-4D26-99D3-D26D1D77BCD3}"/>
               </a:ext>
             </a:extLst>
           </p:cNvPr>
@@ -5180,17 +5248,17 @@
           <a:p>
             <a:r>
               <a:rPr lang="ru-RU" dirty="0"/>
-              <a:t>Диаграммы вариантов использования</a:t>
+              <a:t>Схема спроектированной функции</a:t>
             </a:r>
           </a:p>
         </p:txBody>
       </p:sp>
       <p:pic>
         <p:nvPicPr>
-          <p:cNvPr id="4" name="Рисунок 3">
-            <a:extLst>
-              <a:ext uri="{FF2B5EF4-FFF2-40B4-BE49-F238E27FC236}">
-                <a16:creationId xmlns:a16="http://schemas.microsoft.com/office/drawing/2014/main" id="{526B41CE-D384-42E6-947D-95B5D1D712E9}"/>
+          <p:cNvPr id="5" name="Рисунок 4">
+            <a:extLst>
+              <a:ext uri="{FF2B5EF4-FFF2-40B4-BE49-F238E27FC236}">
+                <a16:creationId xmlns:a16="http://schemas.microsoft.com/office/drawing/2014/main" id="{BF74911C-B3B9-4724-A047-2A541FEDEFEA}"/>
               </a:ext>
             </a:extLst>
           </p:cNvPr>
@@ -5213,83 +5281,479 @@
         </p:blipFill>
         <p:spPr>
           <a:xfrm>
-            <a:off x="6546079" y="2323092"/>
-            <a:ext cx="4933772" cy="3135149"/>
+            <a:off x="1033508" y="1367669"/>
+            <a:ext cx="3002834" cy="5171243"/>
           </a:xfrm>
           <a:prstGeom prst="rect">
             <a:avLst/>
           </a:prstGeom>
         </p:spPr>
       </p:pic>
-      <p:pic>
-        <p:nvPicPr>
-          <p:cNvPr id="8" name="Рисунок 7">
-            <a:extLst>
-              <a:ext uri="{FF2B5EF4-FFF2-40B4-BE49-F238E27FC236}">
-                <a16:creationId xmlns:a16="http://schemas.microsoft.com/office/drawing/2014/main" id="{89E59EEE-1373-464F-BDFE-F010B1EC178F}"/>
-              </a:ext>
-            </a:extLst>
-          </p:cNvPr>
-          <p:cNvPicPr>
-            <a:picLocks noChangeAspect="1"/>
-          </p:cNvPicPr>
+      <p:sp>
+        <p:nvSpPr>
+          <p:cNvPr id="6" name="Місце для номера слайда 5">
+            <a:extLst>
+              <a:ext uri="{FF2B5EF4-FFF2-40B4-BE49-F238E27FC236}">
+                <a16:creationId xmlns:a16="http://schemas.microsoft.com/office/drawing/2014/main" id="{3E13545A-B887-4B08-B5DA-1280A757C030}"/>
+              </a:ext>
+            </a:extLst>
+          </p:cNvPr>
+          <p:cNvSpPr>
+            <a:spLocks noGrp="1"/>
+          </p:cNvSpPr>
+          <p:nvPr>
+            <p:ph type="sldNum" sz="quarter" idx="12"/>
+          </p:nvPr>
+        </p:nvSpPr>
+        <p:spPr/>
+        <p:txBody>
+          <a:bodyPr/>
+          <a:lstStyle/>
+          <a:p>
+            <a:fld id="{D31A221B-4647-4E94-AF60-E3C99F60198D}" type="slidenum">
+              <a:rPr lang="uk-UA" smtClean="0"/>
+              <a:t>7</a:t>
+            </a:fld>
+            <a:endParaRPr lang="uk-UA"/>
+          </a:p>
+        </p:txBody>
+      </p:sp>
+      <p:sp>
+        <p:nvSpPr>
+          <p:cNvPr id="7" name="Прямокутник 6">
+            <a:extLst>
+              <a:ext uri="{FF2B5EF4-FFF2-40B4-BE49-F238E27FC236}">
+                <a16:creationId xmlns:a16="http://schemas.microsoft.com/office/drawing/2014/main" id="{B48F96C0-9124-4D53-AA5A-6551376EF38D}"/>
+              </a:ext>
+            </a:extLst>
+          </p:cNvPr>
+          <p:cNvSpPr/>
           <p:nvPr/>
-        </p:nvPicPr>
-        <p:blipFill>
-          <a:blip r:embed="rId3">
-            <a:extLst>
-              <a:ext uri="{28A0092B-C50C-407E-A947-70E740481C1C}">
-                <a14:useLocalDpi xmlns:a14="http://schemas.microsoft.com/office/drawing/2010/main" val="0"/>
-              </a:ext>
-            </a:extLst>
-          </a:blip>
-          <a:stretch>
-            <a:fillRect/>
-          </a:stretch>
-        </p:blipFill>
+        </p:nvSpPr>
         <p:spPr>
           <a:xfrm>
-            <a:off x="719260" y="2387075"/>
-            <a:ext cx="4926662" cy="3071166"/>
+            <a:off x="4621494" y="1690688"/>
+            <a:ext cx="7017131" cy="4524315"/>
           </a:xfrm>
           <a:prstGeom prst="rect">
             <a:avLst/>
           </a:prstGeom>
         </p:spPr>
-      </p:pic>
-      <p:sp>
-        <p:nvSpPr>
-          <p:cNvPr id="9" name="Місце для номера слайда 8">
-            <a:extLst>
-              <a:ext uri="{FF2B5EF4-FFF2-40B4-BE49-F238E27FC236}">
-                <a16:creationId xmlns:a16="http://schemas.microsoft.com/office/drawing/2014/main" id="{44175B42-81AF-4E41-992E-D7FB431CFB8A}"/>
-              </a:ext>
-            </a:extLst>
-          </p:cNvPr>
-          <p:cNvSpPr>
-            <a:spLocks noGrp="1"/>
-          </p:cNvSpPr>
-          <p:nvPr>
-            <p:ph type="sldNum" sz="quarter" idx="12"/>
-          </p:nvPr>
-        </p:nvSpPr>
-        <p:spPr/>
-        <p:txBody>
-          <a:bodyPr/>
-          <a:lstStyle/>
-          <a:p>
-            <a:fld id="{D31A221B-4647-4E94-AF60-E3C99F60198D}" type="slidenum">
-              <a:rPr lang="uk-UA" smtClean="0"/>
-              <a:t>7</a:t>
-            </a:fld>
-            <a:endParaRPr lang="uk-UA"/>
+        <p:txBody>
+          <a:bodyPr wrap="square">
+            <a:spAutoFit/>
+          </a:bodyPr>
+          <a:lstStyle/>
+          <a:p>
+            <a:r>
+              <a:rPr lang="uk-UA" dirty="0"/>
+              <a:t>CREATE FUNCTION </a:t>
+            </a:r>
+            <a:r>
+              <a:rPr lang="uk-UA" dirty="0" err="1"/>
+              <a:t>GetOrderPrice</a:t>
+            </a:r>
+            <a:r>
+              <a:rPr lang="uk-UA" dirty="0"/>
+              <a:t>(@</a:t>
+            </a:r>
+            <a:r>
+              <a:rPr lang="uk-UA" dirty="0" err="1"/>
+              <a:t>OrderId</a:t>
+            </a:r>
+            <a:r>
+              <a:rPr lang="uk-UA" dirty="0"/>
+              <a:t> </a:t>
+            </a:r>
+            <a:r>
+              <a:rPr lang="uk-UA" dirty="0" err="1"/>
+              <a:t>bigint</a:t>
+            </a:r>
+            <a:r>
+              <a:rPr lang="uk-UA" dirty="0"/>
+              <a:t>)</a:t>
+            </a:r>
+          </a:p>
+          <a:p>
+            <a:r>
+              <a:rPr lang="uk-UA" dirty="0"/>
+              <a:t>RETURNS </a:t>
+            </a:r>
+            <a:r>
+              <a:rPr lang="uk-UA" dirty="0" err="1"/>
+              <a:t>money</a:t>
+            </a:r>
+            <a:endParaRPr lang="uk-UA" dirty="0"/>
+          </a:p>
+          <a:p>
+            <a:r>
+              <a:rPr lang="uk-UA" dirty="0"/>
+              <a:t>BEGIN</a:t>
+            </a:r>
+          </a:p>
+          <a:p>
+            <a:r>
+              <a:rPr lang="uk-UA" dirty="0"/>
+              <a:t>    DECLARE @</a:t>
+            </a:r>
+            <a:r>
+              <a:rPr lang="uk-UA" dirty="0" err="1"/>
+              <a:t>sumTickets</a:t>
+            </a:r>
+            <a:r>
+              <a:rPr lang="uk-UA" dirty="0"/>
+              <a:t> </a:t>
+            </a:r>
+            <a:r>
+              <a:rPr lang="uk-UA" dirty="0" err="1"/>
+              <a:t>money</a:t>
+            </a:r>
+            <a:r>
+              <a:rPr lang="uk-UA" dirty="0"/>
+              <a:t>, @</a:t>
+            </a:r>
+            <a:r>
+              <a:rPr lang="uk-UA" dirty="0" err="1"/>
+              <a:t>sumServices</a:t>
+            </a:r>
+            <a:r>
+              <a:rPr lang="uk-UA" dirty="0"/>
+              <a:t> </a:t>
+            </a:r>
+            <a:r>
+              <a:rPr lang="uk-UA" dirty="0" err="1"/>
+              <a:t>money</a:t>
+            </a:r>
+            <a:r>
+              <a:rPr lang="uk-UA" dirty="0"/>
+              <a:t>, @</a:t>
+            </a:r>
+            <a:r>
+              <a:rPr lang="uk-UA" dirty="0" err="1"/>
+              <a:t>result</a:t>
+            </a:r>
+            <a:r>
+              <a:rPr lang="uk-UA" dirty="0"/>
+              <a:t> </a:t>
+            </a:r>
+            <a:r>
+              <a:rPr lang="uk-UA" dirty="0" err="1"/>
+              <a:t>money</a:t>
+            </a:r>
+            <a:endParaRPr lang="uk-UA" dirty="0"/>
+          </a:p>
+          <a:p>
+            <a:r>
+              <a:rPr lang="uk-UA" dirty="0"/>
+              <a:t>    SET @</a:t>
+            </a:r>
+            <a:r>
+              <a:rPr lang="uk-UA" dirty="0" err="1"/>
+              <a:t>sumTickets</a:t>
+            </a:r>
+            <a:r>
+              <a:rPr lang="uk-UA" dirty="0"/>
+              <a:t> = 0;</a:t>
+            </a:r>
+          </a:p>
+          <a:p>
+            <a:r>
+              <a:rPr lang="uk-UA" dirty="0"/>
+              <a:t>    SET @</a:t>
+            </a:r>
+            <a:r>
+              <a:rPr lang="uk-UA" dirty="0" err="1"/>
+              <a:t>sumServices</a:t>
+            </a:r>
+            <a:r>
+              <a:rPr lang="uk-UA" dirty="0"/>
+              <a:t> = 0;</a:t>
+            </a:r>
+          </a:p>
+          <a:p>
+            <a:r>
+              <a:rPr lang="uk-UA" dirty="0"/>
+              <a:t>    SET @</a:t>
+            </a:r>
+            <a:r>
+              <a:rPr lang="uk-UA" dirty="0" err="1"/>
+              <a:t>result</a:t>
+            </a:r>
+            <a:r>
+              <a:rPr lang="uk-UA" dirty="0"/>
+              <a:t> = 0;</a:t>
+            </a:r>
+          </a:p>
+          <a:p>
+            <a:r>
+              <a:rPr lang="uk-UA" dirty="0"/>
+              <a:t>    SELECT @</a:t>
+            </a:r>
+            <a:r>
+              <a:rPr lang="uk-UA" dirty="0" err="1"/>
+              <a:t>sumTickets</a:t>
+            </a:r>
+            <a:r>
+              <a:rPr lang="uk-UA" dirty="0"/>
+              <a:t> = COALESCE(SUM(</a:t>
+            </a:r>
+            <a:r>
+              <a:rPr lang="uk-UA" dirty="0" err="1"/>
+              <a:t>t.Price</a:t>
+            </a:r>
+            <a:r>
+              <a:rPr lang="uk-UA" dirty="0"/>
+              <a:t>), 0) FROM </a:t>
+            </a:r>
+            <a:r>
+              <a:rPr lang="uk-UA" dirty="0" err="1"/>
+              <a:t>Orders</a:t>
+            </a:r>
+            <a:r>
+              <a:rPr lang="uk-UA" dirty="0"/>
+              <a:t> o </a:t>
+            </a:r>
+          </a:p>
+          <a:p>
+            <a:r>
+              <a:rPr lang="uk-UA" dirty="0"/>
+              <a:t>    JOIN </a:t>
+            </a:r>
+            <a:r>
+              <a:rPr lang="uk-UA" dirty="0" err="1"/>
+              <a:t>Tickets</a:t>
+            </a:r>
+            <a:r>
+              <a:rPr lang="uk-UA" dirty="0"/>
+              <a:t> t ON </a:t>
+            </a:r>
+            <a:r>
+              <a:rPr lang="uk-UA" dirty="0" err="1"/>
+              <a:t>o.Id</a:t>
+            </a:r>
+            <a:r>
+              <a:rPr lang="uk-UA" dirty="0"/>
+              <a:t> = </a:t>
+            </a:r>
+            <a:r>
+              <a:rPr lang="uk-UA" dirty="0" err="1"/>
+              <a:t>t.OrderId</a:t>
+            </a:r>
+            <a:r>
+              <a:rPr lang="uk-UA" dirty="0"/>
+              <a:t> WHERE </a:t>
+            </a:r>
+            <a:r>
+              <a:rPr lang="uk-UA" dirty="0" err="1"/>
+              <a:t>o.Id</a:t>
+            </a:r>
+            <a:r>
+              <a:rPr lang="uk-UA" dirty="0"/>
+              <a:t> = @</a:t>
+            </a:r>
+            <a:r>
+              <a:rPr lang="uk-UA" dirty="0" err="1"/>
+              <a:t>OrderId</a:t>
+            </a:r>
+            <a:r>
+              <a:rPr lang="uk-UA" dirty="0"/>
+              <a:t>;</a:t>
+            </a:r>
+          </a:p>
+          <a:p>
+            <a:r>
+              <a:rPr lang="uk-UA" dirty="0"/>
+              <a:t>    SELECT @</a:t>
+            </a:r>
+            <a:r>
+              <a:rPr lang="uk-UA" dirty="0" err="1"/>
+              <a:t>sumServices</a:t>
+            </a:r>
+            <a:r>
+              <a:rPr lang="uk-UA" dirty="0"/>
+              <a:t> = COALESCE(SUM(</a:t>
+            </a:r>
+            <a:r>
+              <a:rPr lang="uk-UA" dirty="0" err="1"/>
+              <a:t>s.Price</a:t>
+            </a:r>
+            <a:r>
+              <a:rPr lang="uk-UA" dirty="0"/>
+              <a:t>), 0) FROM </a:t>
+            </a:r>
+            <a:r>
+              <a:rPr lang="uk-UA" dirty="0" err="1"/>
+              <a:t>Orders</a:t>
+            </a:r>
+            <a:r>
+              <a:rPr lang="uk-UA" dirty="0"/>
+              <a:t> o </a:t>
+            </a:r>
+          </a:p>
+          <a:p>
+            <a:r>
+              <a:rPr lang="uk-UA" dirty="0"/>
+              <a:t>    JOIN </a:t>
+            </a:r>
+            <a:r>
+              <a:rPr lang="uk-UA" dirty="0" err="1"/>
+              <a:t>Tickets</a:t>
+            </a:r>
+            <a:r>
+              <a:rPr lang="uk-UA" dirty="0"/>
+              <a:t> t ON </a:t>
+            </a:r>
+            <a:r>
+              <a:rPr lang="uk-UA" dirty="0" err="1"/>
+              <a:t>t.OrderId</a:t>
+            </a:r>
+            <a:r>
+              <a:rPr lang="uk-UA" dirty="0"/>
+              <a:t> = @</a:t>
+            </a:r>
+            <a:r>
+              <a:rPr lang="uk-UA" dirty="0" err="1"/>
+              <a:t>OrderId</a:t>
+            </a:r>
+            <a:r>
+              <a:rPr lang="uk-UA" dirty="0"/>
+              <a:t> JOIN</a:t>
+            </a:r>
+          </a:p>
+          <a:p>
+            <a:r>
+              <a:rPr lang="uk-UA" dirty="0"/>
+              <a:t>    </a:t>
+            </a:r>
+            <a:r>
+              <a:rPr lang="uk-UA" dirty="0" err="1"/>
+              <a:t>TicketsServices</a:t>
+            </a:r>
+            <a:r>
+              <a:rPr lang="uk-UA" dirty="0"/>
+              <a:t> </a:t>
+            </a:r>
+            <a:r>
+              <a:rPr lang="uk-UA" dirty="0" err="1"/>
+              <a:t>ts</a:t>
+            </a:r>
+            <a:r>
+              <a:rPr lang="uk-UA" dirty="0"/>
+              <a:t> ON </a:t>
+            </a:r>
+            <a:r>
+              <a:rPr lang="uk-UA" dirty="0" err="1"/>
+              <a:t>t.Id</a:t>
+            </a:r>
+            <a:r>
+              <a:rPr lang="uk-UA" dirty="0"/>
+              <a:t> = </a:t>
+            </a:r>
+            <a:r>
+              <a:rPr lang="uk-UA" dirty="0" err="1"/>
+              <a:t>ts.TicketId</a:t>
+            </a:r>
+            <a:r>
+              <a:rPr lang="uk-UA" dirty="0"/>
+              <a:t> </a:t>
+            </a:r>
+          </a:p>
+          <a:p>
+            <a:r>
+              <a:rPr lang="uk-UA" dirty="0"/>
+              <a:t>    JOIN </a:t>
+            </a:r>
+            <a:r>
+              <a:rPr lang="uk-UA" dirty="0" err="1"/>
+              <a:t>Services</a:t>
+            </a:r>
+            <a:r>
+              <a:rPr lang="uk-UA" dirty="0"/>
+              <a:t> s ON </a:t>
+            </a:r>
+            <a:r>
+              <a:rPr lang="uk-UA" dirty="0" err="1"/>
+              <a:t>s.Id</a:t>
+            </a:r>
+            <a:r>
+              <a:rPr lang="uk-UA" dirty="0"/>
+              <a:t> = </a:t>
+            </a:r>
+            <a:r>
+              <a:rPr lang="uk-UA" dirty="0" err="1"/>
+              <a:t>ts.ServiceId</a:t>
+            </a:r>
+            <a:r>
+              <a:rPr lang="uk-UA" dirty="0"/>
+              <a:t> WHERE </a:t>
+            </a:r>
+            <a:r>
+              <a:rPr lang="uk-UA" dirty="0" err="1"/>
+              <a:t>o.Id</a:t>
+            </a:r>
+            <a:r>
+              <a:rPr lang="uk-UA" dirty="0"/>
+              <a:t> = @</a:t>
+            </a:r>
+            <a:r>
+              <a:rPr lang="uk-UA" dirty="0" err="1"/>
+              <a:t>OrderId</a:t>
+            </a:r>
+            <a:r>
+              <a:rPr lang="uk-UA" dirty="0"/>
+              <a:t>;</a:t>
+            </a:r>
+          </a:p>
+          <a:p>
+            <a:r>
+              <a:rPr lang="uk-UA" dirty="0"/>
+              <a:t>    SELECT @</a:t>
+            </a:r>
+            <a:r>
+              <a:rPr lang="uk-UA" dirty="0" err="1"/>
+              <a:t>result</a:t>
+            </a:r>
+            <a:r>
+              <a:rPr lang="uk-UA" dirty="0"/>
+              <a:t> = @</a:t>
+            </a:r>
+            <a:r>
+              <a:rPr lang="uk-UA" dirty="0" err="1"/>
+              <a:t>sumTickets</a:t>
+            </a:r>
+            <a:r>
+              <a:rPr lang="uk-UA" dirty="0"/>
+              <a:t> + @</a:t>
+            </a:r>
+            <a:r>
+              <a:rPr lang="uk-UA" dirty="0" err="1"/>
+              <a:t>sumServices</a:t>
+            </a:r>
+            <a:endParaRPr lang="uk-UA" dirty="0"/>
+          </a:p>
+          <a:p>
+            <a:r>
+              <a:rPr lang="uk-UA" dirty="0"/>
+              <a:t>RETURN @</a:t>
+            </a:r>
+            <a:r>
+              <a:rPr lang="uk-UA" dirty="0" err="1"/>
+              <a:t>result</a:t>
+            </a:r>
+            <a:endParaRPr lang="uk-UA" dirty="0"/>
+          </a:p>
+          <a:p>
+            <a:r>
+              <a:rPr lang="uk-UA" dirty="0"/>
+              <a:t>END</a:t>
+            </a:r>
           </a:p>
         </p:txBody>
       </p:sp>
     </p:spTree>
     <p:extLst>
       <p:ext uri="{BB962C8B-B14F-4D97-AF65-F5344CB8AC3E}">
-        <p14:creationId xmlns:p14="http://schemas.microsoft.com/office/powerpoint/2010/main" val="282871565"/>
+        <p14:creationId xmlns:p14="http://schemas.microsoft.com/office/powerpoint/2010/main" val="2249939756"/>
       </p:ext>
     </p:extLst>
   </p:cSld>
@@ -5321,7 +5785,7 @@
           <p:cNvPr id="2" name="Заголовок 1">
             <a:extLst>
               <a:ext uri="{FF2B5EF4-FFF2-40B4-BE49-F238E27FC236}">
-                <a16:creationId xmlns:a16="http://schemas.microsoft.com/office/drawing/2014/main" id="{71E503F7-A453-4D26-99D3-D26D1D77BCD3}"/>
+                <a16:creationId xmlns:a16="http://schemas.microsoft.com/office/drawing/2014/main" id="{767982C5-32FF-4104-8585-DCFAC865A5C5}"/>
               </a:ext>
             </a:extLst>
           </p:cNvPr>
@@ -5339,17 +5803,615 @@
           <a:p>
             <a:r>
               <a:rPr lang="ru-RU" dirty="0"/>
-              <a:t>Схема спроектированной функции</a:t>
-            </a:r>
+              <a:t>Результаты исследования</a:t>
+            </a:r>
+          </a:p>
+        </p:txBody>
+      </p:sp>
+      <p:sp>
+        <p:nvSpPr>
+          <p:cNvPr id="6" name="Місце для номера слайда 5">
+            <a:extLst>
+              <a:ext uri="{FF2B5EF4-FFF2-40B4-BE49-F238E27FC236}">
+                <a16:creationId xmlns:a16="http://schemas.microsoft.com/office/drawing/2014/main" id="{3E271630-35B8-4B3B-B0B2-A9D3ED9DEB44}"/>
+              </a:ext>
+            </a:extLst>
+          </p:cNvPr>
+          <p:cNvSpPr>
+            <a:spLocks noGrp="1"/>
+          </p:cNvSpPr>
+          <p:nvPr>
+            <p:ph type="sldNum" sz="quarter" idx="12"/>
+          </p:nvPr>
+        </p:nvSpPr>
+        <p:spPr/>
+        <p:txBody>
+          <a:bodyPr/>
+          <a:lstStyle/>
+          <a:p>
+            <a:fld id="{D31A221B-4647-4E94-AF60-E3C99F60198D}" type="slidenum">
+              <a:rPr lang="uk-UA" smtClean="0"/>
+              <a:t>8</a:t>
+            </a:fld>
+            <a:endParaRPr lang="uk-UA"/>
+          </a:p>
+        </p:txBody>
+      </p:sp>
+      <p:graphicFrame>
+        <p:nvGraphicFramePr>
+          <p:cNvPr id="3" name="Таблиця 2">
+            <a:extLst>
+              <a:ext uri="{FF2B5EF4-FFF2-40B4-BE49-F238E27FC236}">
+                <a16:creationId xmlns:a16="http://schemas.microsoft.com/office/drawing/2014/main" id="{D871E212-2080-496D-A377-393B71B982C5}"/>
+              </a:ext>
+            </a:extLst>
+          </p:cNvPr>
+          <p:cNvGraphicFramePr>
+            <a:graphicFrameLocks noGrp="1"/>
+          </p:cNvGraphicFramePr>
+          <p:nvPr>
+            <p:extLst>
+              <p:ext uri="{D42A27DB-BD31-4B8C-83A1-F6EECF244321}">
+                <p14:modId xmlns:p14="http://schemas.microsoft.com/office/powerpoint/2010/main" val="2211742409"/>
+              </p:ext>
+            </p:extLst>
+          </p:nvPr>
+        </p:nvGraphicFramePr>
+        <p:xfrm>
+          <a:off x="394317" y="2308194"/>
+          <a:ext cx="5464946" cy="3923930"/>
+        </p:xfrm>
+        <a:graphic>
+          <a:graphicData uri="http://schemas.openxmlformats.org/drawingml/2006/table">
+            <a:tbl>
+              <a:tblPr firstRow="1" bandRow="1">
+                <a:tableStyleId>{5940675A-B579-460E-94D1-54222C63F5DA}</a:tableStyleId>
+              </a:tblPr>
+              <a:tblGrid>
+                <a:gridCol w="830801">
+                  <a:extLst>
+                    <a:ext uri="{9D8B030D-6E8A-4147-A177-3AD203B41FA5}">
+                      <a16:colId xmlns:a16="http://schemas.microsoft.com/office/drawing/2014/main" val="2176386554"/>
+                    </a:ext>
+                  </a:extLst>
+                </a:gridCol>
+                <a:gridCol w="1145220">
+                  <a:extLst>
+                    <a:ext uri="{9D8B030D-6E8A-4147-A177-3AD203B41FA5}">
+                      <a16:colId xmlns:a16="http://schemas.microsoft.com/office/drawing/2014/main" val="3893029116"/>
+                    </a:ext>
+                  </a:extLst>
+                </a:gridCol>
+                <a:gridCol w="1660124">
+                  <a:extLst>
+                    <a:ext uri="{9D8B030D-6E8A-4147-A177-3AD203B41FA5}">
+                      <a16:colId xmlns:a16="http://schemas.microsoft.com/office/drawing/2014/main" val="3718343446"/>
+                    </a:ext>
+                  </a:extLst>
+                </a:gridCol>
+                <a:gridCol w="1828801">
+                  <a:extLst>
+                    <a:ext uri="{9D8B030D-6E8A-4147-A177-3AD203B41FA5}">
+                      <a16:colId xmlns:a16="http://schemas.microsoft.com/office/drawing/2014/main" val="4039271824"/>
+                    </a:ext>
+                  </a:extLst>
+                </a:gridCol>
+              </a:tblGrid>
+              <a:tr h="1556600">
+                <a:tc>
+                  <a:txBody>
+                    <a:bodyPr/>
+                    <a:lstStyle/>
+                    <a:p>
+                      <a:pPr algn="r"/>
+                      <a:r>
+                        <a:rPr lang="ru-RU" sz="1400" dirty="0"/>
+                        <a:t>Кол-во строк</a:t>
+                      </a:r>
+                      <a:endParaRPr lang="uk-UA" sz="1400" dirty="0"/>
+                    </a:p>
+                  </a:txBody>
+                  <a:tcPr/>
+                </a:tc>
+                <a:tc>
+                  <a:txBody>
+                    <a:bodyPr/>
+                    <a:lstStyle/>
+                    <a:p>
+                      <a:pPr algn="r"/>
+                      <a:r>
+                        <a:rPr lang="ru-RU" sz="1400" dirty="0"/>
+                        <a:t>Время выполнения запроса без индекса, мс</a:t>
+                      </a:r>
+                      <a:endParaRPr lang="uk-UA" sz="1400" dirty="0"/>
+                    </a:p>
+                  </a:txBody>
+                  <a:tcPr/>
+                </a:tc>
+                <a:tc>
+                  <a:txBody>
+                    <a:bodyPr/>
+                    <a:lstStyle/>
+                    <a:p>
+                      <a:pPr algn="r"/>
+                      <a:r>
+                        <a:rPr lang="ru-RU" sz="1400" dirty="0"/>
+                        <a:t>Время выполнения запроса с кластеризованным индексом, мс</a:t>
+                      </a:r>
+                      <a:endParaRPr lang="uk-UA" sz="1400" dirty="0"/>
+                    </a:p>
+                  </a:txBody>
+                  <a:tcPr/>
+                </a:tc>
+                <a:tc>
+                  <a:txBody>
+                    <a:bodyPr/>
+                    <a:lstStyle/>
+                    <a:p>
+                      <a:pPr algn="r"/>
+                      <a:r>
+                        <a:rPr lang="ru-RU" sz="1400" dirty="0"/>
+                        <a:t>Время выполнения запроса с некластеризованным индексом, мс</a:t>
+                      </a:r>
+                      <a:endParaRPr lang="uk-UA" sz="1400" dirty="0"/>
+                    </a:p>
+                  </a:txBody>
+                  <a:tcPr/>
+                </a:tc>
+                <a:extLst>
+                  <a:ext uri="{0D108BD9-81ED-4DB2-BD59-A6C34878D82A}">
+                    <a16:rowId xmlns:a16="http://schemas.microsoft.com/office/drawing/2014/main" val="2783764745"/>
+                  </a:ext>
+                </a:extLst>
+              </a:tr>
+              <a:tr h="394555">
+                <a:tc>
+                  <a:txBody>
+                    <a:bodyPr/>
+                    <a:lstStyle/>
+                    <a:p>
+                      <a:pPr algn="r"/>
+                      <a:r>
+                        <a:rPr lang="ru-RU" sz="1400" dirty="0"/>
+                        <a:t>100</a:t>
+                      </a:r>
+                      <a:endParaRPr lang="uk-UA" sz="1400" dirty="0"/>
+                    </a:p>
+                  </a:txBody>
+                  <a:tcPr/>
+                </a:tc>
+                <a:tc>
+                  <a:txBody>
+                    <a:bodyPr/>
+                    <a:lstStyle/>
+                    <a:p>
+                      <a:pPr algn="r"/>
+                      <a:r>
+                        <a:rPr lang="ru-RU" sz="1400" dirty="0"/>
+                        <a:t>468</a:t>
+                      </a:r>
+                      <a:endParaRPr lang="uk-UA" sz="1400" dirty="0"/>
+                    </a:p>
+                  </a:txBody>
+                  <a:tcPr/>
+                </a:tc>
+                <a:tc>
+                  <a:txBody>
+                    <a:bodyPr/>
+                    <a:lstStyle/>
+                    <a:p>
+                      <a:pPr algn="r"/>
+                      <a:r>
+                        <a:rPr lang="ru-RU" sz="1400" dirty="0"/>
+                        <a:t>440</a:t>
+                      </a:r>
+                      <a:endParaRPr lang="uk-UA" sz="1400" dirty="0"/>
+                    </a:p>
+                  </a:txBody>
+                  <a:tcPr/>
+                </a:tc>
+                <a:tc>
+                  <a:txBody>
+                    <a:bodyPr/>
+                    <a:lstStyle/>
+                    <a:p>
+                      <a:pPr algn="r"/>
+                      <a:r>
+                        <a:rPr lang="ru-RU" sz="1400" dirty="0"/>
+                        <a:t>450</a:t>
+                      </a:r>
+                      <a:endParaRPr lang="uk-UA" sz="1400" dirty="0"/>
+                    </a:p>
+                  </a:txBody>
+                  <a:tcPr/>
+                </a:tc>
+                <a:extLst>
+                  <a:ext uri="{0D108BD9-81ED-4DB2-BD59-A6C34878D82A}">
+                    <a16:rowId xmlns:a16="http://schemas.microsoft.com/office/drawing/2014/main" val="2577163556"/>
+                  </a:ext>
+                </a:extLst>
+              </a:tr>
+              <a:tr h="394555">
+                <a:tc>
+                  <a:txBody>
+                    <a:bodyPr/>
+                    <a:lstStyle/>
+                    <a:p>
+                      <a:pPr algn="r"/>
+                      <a:r>
+                        <a:rPr lang="ru-RU" sz="1400" dirty="0"/>
+                        <a:t>1000</a:t>
+                      </a:r>
+                      <a:endParaRPr lang="uk-UA" sz="1400" dirty="0"/>
+                    </a:p>
+                  </a:txBody>
+                  <a:tcPr/>
+                </a:tc>
+                <a:tc>
+                  <a:txBody>
+                    <a:bodyPr/>
+                    <a:lstStyle/>
+                    <a:p>
+                      <a:pPr algn="r"/>
+                      <a:r>
+                        <a:rPr lang="ru-RU" sz="1400" dirty="0"/>
+                        <a:t>471</a:t>
+                      </a:r>
+                      <a:endParaRPr lang="uk-UA" sz="1400" dirty="0"/>
+                    </a:p>
+                  </a:txBody>
+                  <a:tcPr/>
+                </a:tc>
+                <a:tc>
+                  <a:txBody>
+                    <a:bodyPr/>
+                    <a:lstStyle/>
+                    <a:p>
+                      <a:pPr algn="r"/>
+                      <a:r>
+                        <a:rPr lang="ru-RU" sz="1400" dirty="0"/>
+                        <a:t>421</a:t>
+                      </a:r>
+                      <a:endParaRPr lang="uk-UA" sz="1400" dirty="0"/>
+                    </a:p>
+                  </a:txBody>
+                  <a:tcPr/>
+                </a:tc>
+                <a:tc>
+                  <a:txBody>
+                    <a:bodyPr/>
+                    <a:lstStyle/>
+                    <a:p>
+                      <a:pPr algn="r"/>
+                      <a:r>
+                        <a:rPr lang="ru-RU" sz="1400" dirty="0"/>
+                        <a:t>439</a:t>
+                      </a:r>
+                      <a:endParaRPr lang="uk-UA" sz="1400" dirty="0"/>
+                    </a:p>
+                  </a:txBody>
+                  <a:tcPr/>
+                </a:tc>
+                <a:extLst>
+                  <a:ext uri="{0D108BD9-81ED-4DB2-BD59-A6C34878D82A}">
+                    <a16:rowId xmlns:a16="http://schemas.microsoft.com/office/drawing/2014/main" val="2898437415"/>
+                  </a:ext>
+                </a:extLst>
+              </a:tr>
+              <a:tr h="394555">
+                <a:tc>
+                  <a:txBody>
+                    <a:bodyPr/>
+                    <a:lstStyle/>
+                    <a:p>
+                      <a:pPr algn="r"/>
+                      <a:r>
+                        <a:rPr lang="ru-RU" sz="1400" dirty="0"/>
+                        <a:t>10000</a:t>
+                      </a:r>
+                      <a:endParaRPr lang="uk-UA" sz="1400" dirty="0"/>
+                    </a:p>
+                  </a:txBody>
+                  <a:tcPr/>
+                </a:tc>
+                <a:tc>
+                  <a:txBody>
+                    <a:bodyPr/>
+                    <a:lstStyle/>
+                    <a:p>
+                      <a:pPr algn="r"/>
+                      <a:r>
+                        <a:rPr lang="ru-RU" sz="1400" dirty="0"/>
+                        <a:t>510</a:t>
+                      </a:r>
+                      <a:endParaRPr lang="uk-UA" sz="1400" dirty="0"/>
+                    </a:p>
+                  </a:txBody>
+                  <a:tcPr/>
+                </a:tc>
+                <a:tc>
+                  <a:txBody>
+                    <a:bodyPr/>
+                    <a:lstStyle/>
+                    <a:p>
+                      <a:pPr algn="r"/>
+                      <a:r>
+                        <a:rPr lang="ru-RU" sz="1400" dirty="0"/>
+                        <a:t>425</a:t>
+                      </a:r>
+                      <a:endParaRPr lang="uk-UA" sz="1400" dirty="0"/>
+                    </a:p>
+                  </a:txBody>
+                  <a:tcPr/>
+                </a:tc>
+                <a:tc>
+                  <a:txBody>
+                    <a:bodyPr/>
+                    <a:lstStyle/>
+                    <a:p>
+                      <a:pPr algn="r"/>
+                      <a:r>
+                        <a:rPr lang="ru-RU" sz="1400" dirty="0"/>
+                        <a:t>445</a:t>
+                      </a:r>
+                      <a:endParaRPr lang="uk-UA" sz="1400" dirty="0"/>
+                    </a:p>
+                  </a:txBody>
+                  <a:tcPr/>
+                </a:tc>
+                <a:extLst>
+                  <a:ext uri="{0D108BD9-81ED-4DB2-BD59-A6C34878D82A}">
+                    <a16:rowId xmlns:a16="http://schemas.microsoft.com/office/drawing/2014/main" val="3231497205"/>
+                  </a:ext>
+                </a:extLst>
+              </a:tr>
+              <a:tr h="394555">
+                <a:tc>
+                  <a:txBody>
+                    <a:bodyPr/>
+                    <a:lstStyle/>
+                    <a:p>
+                      <a:pPr algn="r"/>
+                      <a:r>
+                        <a:rPr lang="ru-RU" sz="1400" dirty="0"/>
+                        <a:t>50000</a:t>
+                      </a:r>
+                      <a:endParaRPr lang="uk-UA" sz="1400" dirty="0"/>
+                    </a:p>
+                  </a:txBody>
+                  <a:tcPr/>
+                </a:tc>
+                <a:tc>
+                  <a:txBody>
+                    <a:bodyPr/>
+                    <a:lstStyle/>
+                    <a:p>
+                      <a:pPr algn="r"/>
+                      <a:r>
+                        <a:rPr lang="ru-RU" sz="1400" dirty="0"/>
+                        <a:t>757</a:t>
+                      </a:r>
+                      <a:endParaRPr lang="uk-UA" sz="1400" dirty="0"/>
+                    </a:p>
+                  </a:txBody>
+                  <a:tcPr/>
+                </a:tc>
+                <a:tc>
+                  <a:txBody>
+                    <a:bodyPr/>
+                    <a:lstStyle/>
+                    <a:p>
+                      <a:pPr algn="r"/>
+                      <a:r>
+                        <a:rPr lang="ru-RU" sz="1400" dirty="0"/>
+                        <a:t>414</a:t>
+                      </a:r>
+                      <a:endParaRPr lang="uk-UA" sz="1400" dirty="0"/>
+                    </a:p>
+                  </a:txBody>
+                  <a:tcPr/>
+                </a:tc>
+                <a:tc>
+                  <a:txBody>
+                    <a:bodyPr/>
+                    <a:lstStyle/>
+                    <a:p>
+                      <a:pPr algn="r"/>
+                      <a:r>
+                        <a:rPr lang="ru-RU" sz="1400" dirty="0"/>
+                        <a:t>453</a:t>
+                      </a:r>
+                      <a:endParaRPr lang="uk-UA" sz="1400" dirty="0"/>
+                    </a:p>
+                  </a:txBody>
+                  <a:tcPr/>
+                </a:tc>
+                <a:extLst>
+                  <a:ext uri="{0D108BD9-81ED-4DB2-BD59-A6C34878D82A}">
+                    <a16:rowId xmlns:a16="http://schemas.microsoft.com/office/drawing/2014/main" val="37649387"/>
+                  </a:ext>
+                </a:extLst>
+              </a:tr>
+              <a:tr h="394555">
+                <a:tc>
+                  <a:txBody>
+                    <a:bodyPr/>
+                    <a:lstStyle/>
+                    <a:p>
+                      <a:pPr algn="r"/>
+                      <a:r>
+                        <a:rPr lang="ru-RU" sz="1400" dirty="0"/>
+                        <a:t>100000</a:t>
+                      </a:r>
+                      <a:endParaRPr lang="uk-UA" sz="1400" dirty="0"/>
+                    </a:p>
+                  </a:txBody>
+                  <a:tcPr/>
+                </a:tc>
+                <a:tc>
+                  <a:txBody>
+                    <a:bodyPr/>
+                    <a:lstStyle/>
+                    <a:p>
+                      <a:pPr algn="r"/>
+                      <a:r>
+                        <a:rPr lang="ru-RU" sz="1400" dirty="0"/>
+                        <a:t>1642</a:t>
+                      </a:r>
+                      <a:endParaRPr lang="uk-UA" sz="1400" dirty="0"/>
+                    </a:p>
+                  </a:txBody>
+                  <a:tcPr/>
+                </a:tc>
+                <a:tc>
+                  <a:txBody>
+                    <a:bodyPr/>
+                    <a:lstStyle/>
+                    <a:p>
+                      <a:pPr algn="r"/>
+                      <a:r>
+                        <a:rPr lang="ru-RU" sz="1400" dirty="0"/>
+                        <a:t>472</a:t>
+                      </a:r>
+                      <a:endParaRPr lang="uk-UA" sz="1400" dirty="0"/>
+                    </a:p>
+                  </a:txBody>
+                  <a:tcPr/>
+                </a:tc>
+                <a:tc>
+                  <a:txBody>
+                    <a:bodyPr/>
+                    <a:lstStyle/>
+                    <a:p>
+                      <a:pPr algn="r"/>
+                      <a:r>
+                        <a:rPr lang="ru-RU" sz="1400" dirty="0"/>
+                        <a:t>460</a:t>
+                      </a:r>
+                      <a:endParaRPr lang="uk-UA" sz="1400" dirty="0"/>
+                    </a:p>
+                  </a:txBody>
+                  <a:tcPr/>
+                </a:tc>
+                <a:extLst>
+                  <a:ext uri="{0D108BD9-81ED-4DB2-BD59-A6C34878D82A}">
+                    <a16:rowId xmlns:a16="http://schemas.microsoft.com/office/drawing/2014/main" val="406370677"/>
+                  </a:ext>
+                </a:extLst>
+              </a:tr>
+              <a:tr h="394555">
+                <a:tc>
+                  <a:txBody>
+                    <a:bodyPr/>
+                    <a:lstStyle/>
+                    <a:p>
+                      <a:pPr algn="r"/>
+                      <a:r>
+                        <a:rPr lang="ru-RU" sz="1400" dirty="0"/>
+                        <a:t>250000</a:t>
+                      </a:r>
+                      <a:endParaRPr lang="uk-UA" sz="1400" dirty="0"/>
+                    </a:p>
+                  </a:txBody>
+                  <a:tcPr/>
+                </a:tc>
+                <a:tc>
+                  <a:txBody>
+                    <a:bodyPr/>
+                    <a:lstStyle/>
+                    <a:p>
+                      <a:pPr algn="r"/>
+                      <a:r>
+                        <a:rPr lang="ru-RU" sz="1400" dirty="0"/>
+                        <a:t>10701</a:t>
+                      </a:r>
+                      <a:endParaRPr lang="uk-UA" sz="1400" dirty="0"/>
+                    </a:p>
+                  </a:txBody>
+                  <a:tcPr/>
+                </a:tc>
+                <a:tc>
+                  <a:txBody>
+                    <a:bodyPr/>
+                    <a:lstStyle/>
+                    <a:p>
+                      <a:pPr algn="r"/>
+                      <a:r>
+                        <a:rPr lang="ru-RU" sz="1400" dirty="0"/>
+                        <a:t>498</a:t>
+                      </a:r>
+                      <a:endParaRPr lang="uk-UA" sz="1400" dirty="0"/>
+                    </a:p>
+                  </a:txBody>
+                  <a:tcPr/>
+                </a:tc>
+                <a:tc>
+                  <a:txBody>
+                    <a:bodyPr/>
+                    <a:lstStyle/>
+                    <a:p>
+                      <a:pPr algn="r"/>
+                      <a:r>
+                        <a:rPr lang="ru-RU" sz="1400" dirty="0"/>
+                        <a:t>510</a:t>
+                      </a:r>
+                      <a:endParaRPr lang="uk-UA" sz="1400" dirty="0"/>
+                    </a:p>
+                  </a:txBody>
+                  <a:tcPr/>
+                </a:tc>
+                <a:extLst>
+                  <a:ext uri="{0D108BD9-81ED-4DB2-BD59-A6C34878D82A}">
+                    <a16:rowId xmlns:a16="http://schemas.microsoft.com/office/drawing/2014/main" val="4084591450"/>
+                  </a:ext>
+                </a:extLst>
+              </a:tr>
+            </a:tbl>
+          </a:graphicData>
+        </a:graphic>
+      </p:graphicFrame>
+      <p:sp>
+        <p:nvSpPr>
+          <p:cNvPr id="7" name="TextBox 6">
+            <a:extLst>
+              <a:ext uri="{FF2B5EF4-FFF2-40B4-BE49-F238E27FC236}">
+                <a16:creationId xmlns:a16="http://schemas.microsoft.com/office/drawing/2014/main" id="{D2E1342C-92A8-4B1E-938D-8A5060D1861D}"/>
+              </a:ext>
+            </a:extLst>
+          </p:cNvPr>
+          <p:cNvSpPr txBox="1"/>
+          <p:nvPr/>
+        </p:nvSpPr>
+        <p:spPr>
+          <a:xfrm>
+            <a:off x="394317" y="1648038"/>
+            <a:ext cx="5464946" cy="584775"/>
+          </a:xfrm>
+          <a:prstGeom prst="rect">
+            <a:avLst/>
+          </a:prstGeom>
+          <a:noFill/>
+        </p:spPr>
+        <p:txBody>
+          <a:bodyPr wrap="square" rtlCol="0">
+            <a:spAutoFit/>
+          </a:bodyPr>
+          <a:lstStyle/>
+          <a:p>
+            <a:r>
+              <a:rPr lang="ru-RU" sz="1600" dirty="0"/>
+              <a:t>Время выполнения запроса при поиске первой записи в таблице</a:t>
+            </a:r>
+            <a:endParaRPr lang="uk-UA" sz="1600" dirty="0"/>
           </a:p>
         </p:txBody>
       </p:sp>
       <p:pic>
         <p:nvPicPr>
-          <p:cNvPr id="5" name="Рисунок 4">
-            <a:extLst>
-              <a:ext uri="{FF2B5EF4-FFF2-40B4-BE49-F238E27FC236}">
-                <a16:creationId xmlns:a16="http://schemas.microsoft.com/office/drawing/2014/main" id="{BF74911C-B3B9-4724-A047-2A541FEDEFEA}"/>
+          <p:cNvPr id="8" name="Рисунок 7">
+            <a:extLst>
+              <a:ext uri="{FF2B5EF4-FFF2-40B4-BE49-F238E27FC236}">
+                <a16:creationId xmlns:a16="http://schemas.microsoft.com/office/drawing/2014/main" id="{104DBA54-F2E9-482D-96BF-D3799CEA3C9C}"/>
               </a:ext>
             </a:extLst>
           </p:cNvPr>
@@ -5359,21 +6421,15 @@
           <p:nvPr/>
         </p:nvPicPr>
         <p:blipFill>
-          <a:blip r:embed="rId2">
-            <a:extLst>
-              <a:ext uri="{28A0092B-C50C-407E-A947-70E740481C1C}">
-                <a14:useLocalDpi xmlns:a14="http://schemas.microsoft.com/office/drawing/2010/main" val="0"/>
-              </a:ext>
-            </a:extLst>
-          </a:blip>
+          <a:blip r:embed="rId2"/>
           <a:stretch>
             <a:fillRect/>
           </a:stretch>
         </p:blipFill>
         <p:spPr>
           <a:xfrm>
-            <a:off x="4594583" y="1473692"/>
-            <a:ext cx="3002834" cy="5171243"/>
+            <a:off x="6213259" y="1503855"/>
+            <a:ext cx="5464946" cy="3976703"/>
           </a:xfrm>
           <a:prstGeom prst="rect">
             <a:avLst/>
@@ -5382,37 +6438,44 @@
       </p:pic>
       <p:sp>
         <p:nvSpPr>
-          <p:cNvPr id="6" name="Місце для номера слайда 5">
-            <a:extLst>
-              <a:ext uri="{FF2B5EF4-FFF2-40B4-BE49-F238E27FC236}">
-                <a16:creationId xmlns:a16="http://schemas.microsoft.com/office/drawing/2014/main" id="{3E13545A-B887-4B08-B5DA-1280A757C030}"/>
-              </a:ext>
-            </a:extLst>
-          </p:cNvPr>
-          <p:cNvSpPr>
-            <a:spLocks noGrp="1"/>
-          </p:cNvSpPr>
-          <p:nvPr>
-            <p:ph type="sldNum" sz="quarter" idx="12"/>
-          </p:nvPr>
-        </p:nvSpPr>
-        <p:spPr/>
-        <p:txBody>
-          <a:bodyPr/>
-          <a:lstStyle/>
-          <a:p>
-            <a:fld id="{D31A221B-4647-4E94-AF60-E3C99F60198D}" type="slidenum">
-              <a:rPr lang="uk-UA" smtClean="0"/>
-              <a:t>8</a:t>
-            </a:fld>
-            <a:endParaRPr lang="uk-UA"/>
+          <p:cNvPr id="9" name="TextBox 8">
+            <a:extLst>
+              <a:ext uri="{FF2B5EF4-FFF2-40B4-BE49-F238E27FC236}">
+                <a16:creationId xmlns:a16="http://schemas.microsoft.com/office/drawing/2014/main" id="{2C9018D6-BD5D-4800-9158-08C29D965D05}"/>
+              </a:ext>
+            </a:extLst>
+          </p:cNvPr>
+          <p:cNvSpPr txBox="1"/>
+          <p:nvPr/>
+        </p:nvSpPr>
+        <p:spPr>
+          <a:xfrm>
+            <a:off x="6611722" y="5480558"/>
+            <a:ext cx="5066484" cy="584775"/>
+          </a:xfrm>
+          <a:prstGeom prst="rect">
+            <a:avLst/>
+          </a:prstGeom>
+          <a:noFill/>
+        </p:spPr>
+        <p:txBody>
+          <a:bodyPr wrap="square" rtlCol="0">
+            <a:spAutoFit/>
+          </a:bodyPr>
+          <a:lstStyle/>
+          <a:p>
+            <a:r>
+              <a:rPr lang="ru-RU" sz="1600" dirty="0"/>
+              <a:t>Зависимость времени выполнения запроса от количества строк в таблице при поиске первой записи</a:t>
+            </a:r>
+            <a:endParaRPr lang="uk-UA" sz="1600" dirty="0"/>
           </a:p>
         </p:txBody>
       </p:sp>
     </p:spTree>
     <p:extLst>
       <p:ext uri="{BB962C8B-B14F-4D97-AF65-F5344CB8AC3E}">
-        <p14:creationId xmlns:p14="http://schemas.microsoft.com/office/powerpoint/2010/main" val="2249939756"/>
+        <p14:creationId xmlns:p14="http://schemas.microsoft.com/office/powerpoint/2010/main" val="1056103837"/>
       </p:ext>
     </p:extLst>
   </p:cSld>
@@ -5467,12 +6530,113 @@
           </a:p>
         </p:txBody>
       </p:sp>
+      <p:sp>
+        <p:nvSpPr>
+          <p:cNvPr id="6" name="Місце для номера слайда 5">
+            <a:extLst>
+              <a:ext uri="{FF2B5EF4-FFF2-40B4-BE49-F238E27FC236}">
+                <a16:creationId xmlns:a16="http://schemas.microsoft.com/office/drawing/2014/main" id="{3E271630-35B8-4B3B-B0B2-A9D3ED9DEB44}"/>
+              </a:ext>
+            </a:extLst>
+          </p:cNvPr>
+          <p:cNvSpPr>
+            <a:spLocks noGrp="1"/>
+          </p:cNvSpPr>
+          <p:nvPr>
+            <p:ph type="sldNum" sz="quarter" idx="12"/>
+          </p:nvPr>
+        </p:nvSpPr>
+        <p:spPr/>
+        <p:txBody>
+          <a:bodyPr/>
+          <a:lstStyle/>
+          <a:p>
+            <a:fld id="{D31A221B-4647-4E94-AF60-E3C99F60198D}" type="slidenum">
+              <a:rPr lang="uk-UA" smtClean="0"/>
+              <a:t>9</a:t>
+            </a:fld>
+            <a:endParaRPr lang="uk-UA"/>
+          </a:p>
+        </p:txBody>
+      </p:sp>
+      <p:sp>
+        <p:nvSpPr>
+          <p:cNvPr id="7" name="TextBox 6">
+            <a:extLst>
+              <a:ext uri="{FF2B5EF4-FFF2-40B4-BE49-F238E27FC236}">
+                <a16:creationId xmlns:a16="http://schemas.microsoft.com/office/drawing/2014/main" id="{D2E1342C-92A8-4B1E-938D-8A5060D1861D}"/>
+              </a:ext>
+            </a:extLst>
+          </p:cNvPr>
+          <p:cNvSpPr txBox="1"/>
+          <p:nvPr/>
+        </p:nvSpPr>
+        <p:spPr>
+          <a:xfrm>
+            <a:off x="394317" y="1648038"/>
+            <a:ext cx="5464946" cy="584775"/>
+          </a:xfrm>
+          <a:prstGeom prst="rect">
+            <a:avLst/>
+          </a:prstGeom>
+          <a:noFill/>
+        </p:spPr>
+        <p:txBody>
+          <a:bodyPr wrap="square" rtlCol="0">
+            <a:spAutoFit/>
+          </a:bodyPr>
+          <a:lstStyle/>
+          <a:p>
+            <a:r>
+              <a:rPr lang="ru-RU" sz="1600" dirty="0"/>
+              <a:t>Время выполнения запроса при поиске последней записи в таблице</a:t>
+            </a:r>
+            <a:endParaRPr lang="uk-UA" sz="1600" dirty="0"/>
+          </a:p>
+        </p:txBody>
+      </p:sp>
+      <p:sp>
+        <p:nvSpPr>
+          <p:cNvPr id="9" name="TextBox 8">
+            <a:extLst>
+              <a:ext uri="{FF2B5EF4-FFF2-40B4-BE49-F238E27FC236}">
+                <a16:creationId xmlns:a16="http://schemas.microsoft.com/office/drawing/2014/main" id="{2C9018D6-BD5D-4800-9158-08C29D965D05}"/>
+              </a:ext>
+            </a:extLst>
+          </p:cNvPr>
+          <p:cNvSpPr txBox="1"/>
+          <p:nvPr/>
+        </p:nvSpPr>
+        <p:spPr>
+          <a:xfrm>
+            <a:off x="6611722" y="5480558"/>
+            <a:ext cx="5066484" cy="830997"/>
+          </a:xfrm>
+          <a:prstGeom prst="rect">
+            <a:avLst/>
+          </a:prstGeom>
+          <a:noFill/>
+        </p:spPr>
+        <p:txBody>
+          <a:bodyPr wrap="square" rtlCol="0">
+            <a:spAutoFit/>
+          </a:bodyPr>
+          <a:lstStyle/>
+          <a:p>
+            <a:r>
+              <a:rPr lang="ru-RU" sz="1600" dirty="0"/>
+              <a:t>Зависимость времени выполнения запроса от количества строк в таблице при поиске последней записи</a:t>
+            </a:r>
+            <a:endParaRPr lang="uk-UA" sz="1600" dirty="0"/>
+          </a:p>
+        </p:txBody>
+      </p:sp>
       <p:pic>
         <p:nvPicPr>
-          <p:cNvPr id="4" name="Рисунок 3">
-            <a:extLst>
-              <a:ext uri="{FF2B5EF4-FFF2-40B4-BE49-F238E27FC236}">
-                <a16:creationId xmlns:a16="http://schemas.microsoft.com/office/drawing/2014/main" id="{7E3B0D47-1CBB-4DB3-BC8E-118678F3764A}"/>
+          <p:cNvPr id="10" name="Рисунок 9">
+            <a:extLst>
+              <a:ext uri="{FF2B5EF4-FFF2-40B4-BE49-F238E27FC236}">
+                <a16:creationId xmlns:a16="http://schemas.microsoft.com/office/drawing/2014/main" id="{35ED1B02-36FF-4FAC-AFDB-994E4B4484F5}"/>
               </a:ext>
             </a:extLst>
           </p:cNvPr>
@@ -5489,77 +6653,551 @@
         </p:blipFill>
         <p:spPr>
           <a:xfrm>
-            <a:off x="838200" y="2272683"/>
-            <a:ext cx="4700528" cy="3420455"/>
+            <a:off x="6196448" y="1503856"/>
+            <a:ext cx="5481758" cy="3976702"/>
           </a:xfrm>
           <a:prstGeom prst="rect">
             <a:avLst/>
           </a:prstGeom>
         </p:spPr>
       </p:pic>
-      <p:pic>
-        <p:nvPicPr>
-          <p:cNvPr id="5" name="Рисунок 4">
-            <a:extLst>
-              <a:ext uri="{FF2B5EF4-FFF2-40B4-BE49-F238E27FC236}">
-                <a16:creationId xmlns:a16="http://schemas.microsoft.com/office/drawing/2014/main" id="{B0525641-BD7A-43B9-9711-CA805F236ABD}"/>
-              </a:ext>
-            </a:extLst>
-          </p:cNvPr>
-          <p:cNvPicPr>
-            <a:picLocks noChangeAspect="1"/>
-          </p:cNvPicPr>
-          <p:nvPr/>
-        </p:nvPicPr>
-        <p:blipFill>
-          <a:blip r:embed="rId3"/>
-          <a:stretch>
-            <a:fillRect/>
-          </a:stretch>
-        </p:blipFill>
-        <p:spPr>
-          <a:xfrm>
-            <a:off x="7096958" y="2272684"/>
-            <a:ext cx="4714988" cy="3420454"/>
-          </a:xfrm>
-          <a:prstGeom prst="rect">
-            <a:avLst/>
-          </a:prstGeom>
-        </p:spPr>
-      </p:pic>
-      <p:sp>
-        <p:nvSpPr>
-          <p:cNvPr id="6" name="Місце для номера слайда 5">
-            <a:extLst>
-              <a:ext uri="{FF2B5EF4-FFF2-40B4-BE49-F238E27FC236}">
-                <a16:creationId xmlns:a16="http://schemas.microsoft.com/office/drawing/2014/main" id="{3E271630-35B8-4B3B-B0B2-A9D3ED9DEB44}"/>
-              </a:ext>
-            </a:extLst>
-          </p:cNvPr>
-          <p:cNvSpPr>
-            <a:spLocks noGrp="1"/>
-          </p:cNvSpPr>
-          <p:nvPr>
-            <p:ph type="sldNum" sz="quarter" idx="12"/>
-          </p:nvPr>
-        </p:nvSpPr>
-        <p:spPr/>
-        <p:txBody>
-          <a:bodyPr/>
-          <a:lstStyle/>
-          <a:p>
-            <a:fld id="{D31A221B-4647-4E94-AF60-E3C99F60198D}" type="slidenum">
-              <a:rPr lang="uk-UA" smtClean="0"/>
-              <a:t>9</a:t>
-            </a:fld>
-            <a:endParaRPr lang="uk-UA"/>
-          </a:p>
-        </p:txBody>
-      </p:sp>
+      <p:graphicFrame>
+        <p:nvGraphicFramePr>
+          <p:cNvPr id="11" name="Таблиця 10">
+            <a:extLst>
+              <a:ext uri="{FF2B5EF4-FFF2-40B4-BE49-F238E27FC236}">
+                <a16:creationId xmlns:a16="http://schemas.microsoft.com/office/drawing/2014/main" id="{7D8CB338-EA13-4C5D-BA14-B3A067A69906}"/>
+              </a:ext>
+            </a:extLst>
+          </p:cNvPr>
+          <p:cNvGraphicFramePr>
+            <a:graphicFrameLocks noGrp="1"/>
+          </p:cNvGraphicFramePr>
+          <p:nvPr>
+            <p:extLst>
+              <p:ext uri="{D42A27DB-BD31-4B8C-83A1-F6EECF244321}">
+                <p14:modId xmlns:p14="http://schemas.microsoft.com/office/powerpoint/2010/main" val="2180931411"/>
+              </p:ext>
+            </p:extLst>
+          </p:nvPr>
+        </p:nvGraphicFramePr>
+        <p:xfrm>
+          <a:off x="394317" y="2387624"/>
+          <a:ext cx="5464944" cy="3923931"/>
+        </p:xfrm>
+        <a:graphic>
+          <a:graphicData uri="http://schemas.openxmlformats.org/drawingml/2006/table">
+            <a:tbl>
+              <a:tblPr firstRow="1" bandRow="1">
+                <a:tableStyleId>{5940675A-B579-460E-94D1-54222C63F5DA}</a:tableStyleId>
+              </a:tblPr>
+              <a:tblGrid>
+                <a:gridCol w="830802">
+                  <a:extLst>
+                    <a:ext uri="{9D8B030D-6E8A-4147-A177-3AD203B41FA5}">
+                      <a16:colId xmlns:a16="http://schemas.microsoft.com/office/drawing/2014/main" val="2176386554"/>
+                    </a:ext>
+                  </a:extLst>
+                </a:gridCol>
+                <a:gridCol w="1154098">
+                  <a:extLst>
+                    <a:ext uri="{9D8B030D-6E8A-4147-A177-3AD203B41FA5}">
+                      <a16:colId xmlns:a16="http://schemas.microsoft.com/office/drawing/2014/main" val="3893029116"/>
+                    </a:ext>
+                  </a:extLst>
+                </a:gridCol>
+                <a:gridCol w="1651246">
+                  <a:extLst>
+                    <a:ext uri="{9D8B030D-6E8A-4147-A177-3AD203B41FA5}">
+                      <a16:colId xmlns:a16="http://schemas.microsoft.com/office/drawing/2014/main" val="3718343446"/>
+                    </a:ext>
+                  </a:extLst>
+                </a:gridCol>
+                <a:gridCol w="1828798">
+                  <a:extLst>
+                    <a:ext uri="{9D8B030D-6E8A-4147-A177-3AD203B41FA5}">
+                      <a16:colId xmlns:a16="http://schemas.microsoft.com/office/drawing/2014/main" val="4039271824"/>
+                    </a:ext>
+                  </a:extLst>
+                </a:gridCol>
+              </a:tblGrid>
+              <a:tr h="1471899">
+                <a:tc>
+                  <a:txBody>
+                    <a:bodyPr/>
+                    <a:lstStyle/>
+                    <a:p>
+                      <a:pPr algn="r"/>
+                      <a:r>
+                        <a:rPr lang="ru-RU" sz="1400" dirty="0"/>
+                        <a:t>Кол-во строк</a:t>
+                      </a:r>
+                      <a:endParaRPr lang="uk-UA" sz="1400" dirty="0"/>
+                    </a:p>
+                  </a:txBody>
+                  <a:tcPr/>
+                </a:tc>
+                <a:tc>
+                  <a:txBody>
+                    <a:bodyPr/>
+                    <a:lstStyle/>
+                    <a:p>
+                      <a:pPr algn="r"/>
+                      <a:r>
+                        <a:rPr lang="ru-RU" sz="1400" dirty="0"/>
+                        <a:t>Время выполнения запроса без индекса, мс</a:t>
+                      </a:r>
+                      <a:endParaRPr lang="uk-UA" sz="1400" dirty="0"/>
+                    </a:p>
+                  </a:txBody>
+                  <a:tcPr/>
+                </a:tc>
+                <a:tc>
+                  <a:txBody>
+                    <a:bodyPr/>
+                    <a:lstStyle/>
+                    <a:p>
+                      <a:pPr algn="r"/>
+                      <a:r>
+                        <a:rPr lang="ru-RU" sz="1400" dirty="0"/>
+                        <a:t>Время выполнения запроса с кластеризованным индексом, мс</a:t>
+                      </a:r>
+                      <a:endParaRPr lang="uk-UA" sz="1400" dirty="0"/>
+                    </a:p>
+                  </a:txBody>
+                  <a:tcPr/>
+                </a:tc>
+                <a:tc>
+                  <a:txBody>
+                    <a:bodyPr/>
+                    <a:lstStyle/>
+                    <a:p>
+                      <a:pPr algn="r"/>
+                      <a:r>
+                        <a:rPr lang="ru-RU" sz="1400" dirty="0"/>
+                        <a:t>Время выполнения запроса с некластеризованным индексом, мс</a:t>
+                      </a:r>
+                      <a:endParaRPr lang="uk-UA" sz="1400" dirty="0"/>
+                    </a:p>
+                  </a:txBody>
+                  <a:tcPr/>
+                </a:tc>
+                <a:extLst>
+                  <a:ext uri="{0D108BD9-81ED-4DB2-BD59-A6C34878D82A}">
+                    <a16:rowId xmlns:a16="http://schemas.microsoft.com/office/drawing/2014/main" val="2783764745"/>
+                  </a:ext>
+                </a:extLst>
+              </a:tr>
+              <a:tr h="408672">
+                <a:tc>
+                  <a:txBody>
+                    <a:bodyPr/>
+                    <a:lstStyle/>
+                    <a:p>
+                      <a:pPr algn="r"/>
+                      <a:r>
+                        <a:rPr lang="ru-RU" sz="1400" dirty="0"/>
+                        <a:t>100</a:t>
+                      </a:r>
+                      <a:endParaRPr lang="uk-UA" sz="1400" dirty="0"/>
+                    </a:p>
+                  </a:txBody>
+                  <a:tcPr/>
+                </a:tc>
+                <a:tc>
+                  <a:txBody>
+                    <a:bodyPr/>
+                    <a:lstStyle/>
+                    <a:p>
+                      <a:pPr algn="r"/>
+                      <a:r>
+                        <a:rPr lang="ru-RU" sz="1400" dirty="0"/>
+                        <a:t>495</a:t>
+                      </a:r>
+                      <a:endParaRPr lang="uk-UA" sz="1400" dirty="0"/>
+                    </a:p>
+                  </a:txBody>
+                  <a:tcPr/>
+                </a:tc>
+                <a:tc>
+                  <a:txBody>
+                    <a:bodyPr/>
+                    <a:lstStyle/>
+                    <a:p>
+                      <a:pPr algn="r"/>
+                      <a:r>
+                        <a:rPr lang="ru-RU" sz="1400" dirty="0"/>
+                        <a:t>442</a:t>
+                      </a:r>
+                      <a:endParaRPr lang="uk-UA" sz="1400" dirty="0"/>
+                    </a:p>
+                  </a:txBody>
+                  <a:tcPr/>
+                </a:tc>
+                <a:tc>
+                  <a:txBody>
+                    <a:bodyPr/>
+                    <a:lstStyle/>
+                    <a:p>
+                      <a:pPr algn="r"/>
+                      <a:r>
+                        <a:rPr lang="ru-RU" sz="1400" dirty="0"/>
+                        <a:t>461</a:t>
+                      </a:r>
+                      <a:endParaRPr lang="uk-UA" sz="1400" dirty="0"/>
+                    </a:p>
+                  </a:txBody>
+                  <a:tcPr/>
+                </a:tc>
+                <a:extLst>
+                  <a:ext uri="{0D108BD9-81ED-4DB2-BD59-A6C34878D82A}">
+                    <a16:rowId xmlns:a16="http://schemas.microsoft.com/office/drawing/2014/main" val="2577163556"/>
+                  </a:ext>
+                </a:extLst>
+              </a:tr>
+              <a:tr h="408672">
+                <a:tc>
+                  <a:txBody>
+                    <a:bodyPr/>
+                    <a:lstStyle/>
+                    <a:p>
+                      <a:pPr algn="r"/>
+                      <a:r>
+                        <a:rPr lang="ru-RU" sz="1400" dirty="0"/>
+                        <a:t>1000</a:t>
+                      </a:r>
+                      <a:endParaRPr lang="uk-UA" sz="1400" dirty="0"/>
+                    </a:p>
+                  </a:txBody>
+                  <a:tcPr/>
+                </a:tc>
+                <a:tc>
+                  <a:txBody>
+                    <a:bodyPr/>
+                    <a:lstStyle/>
+                    <a:p>
+                      <a:pPr algn="r"/>
+                      <a:r>
+                        <a:rPr lang="ru-RU" sz="1400" dirty="0"/>
+                        <a:t>644</a:t>
+                      </a:r>
+                      <a:endParaRPr lang="uk-UA" sz="1400" dirty="0"/>
+                    </a:p>
+                  </a:txBody>
+                  <a:tcPr/>
+                </a:tc>
+                <a:tc>
+                  <a:txBody>
+                    <a:bodyPr/>
+                    <a:lstStyle/>
+                    <a:p>
+                      <a:pPr algn="r"/>
+                      <a:r>
+                        <a:rPr lang="ru-RU" sz="1400" dirty="0"/>
+                        <a:t>448</a:t>
+                      </a:r>
+                      <a:endParaRPr lang="uk-UA" sz="1400" dirty="0"/>
+                    </a:p>
+                  </a:txBody>
+                  <a:tcPr/>
+                </a:tc>
+                <a:tc>
+                  <a:txBody>
+                    <a:bodyPr/>
+                    <a:lstStyle/>
+                    <a:p>
+                      <a:pPr algn="r"/>
+                      <a:r>
+                        <a:rPr lang="ru-RU" sz="1400" dirty="0"/>
+                        <a:t>452</a:t>
+                      </a:r>
+                      <a:endParaRPr lang="uk-UA" sz="1400" dirty="0"/>
+                    </a:p>
+                  </a:txBody>
+                  <a:tcPr/>
+                </a:tc>
+                <a:extLst>
+                  <a:ext uri="{0D108BD9-81ED-4DB2-BD59-A6C34878D82A}">
+                    <a16:rowId xmlns:a16="http://schemas.microsoft.com/office/drawing/2014/main" val="2898437415"/>
+                  </a:ext>
+                </a:extLst>
+              </a:tr>
+              <a:tr h="408672">
+                <a:tc>
+                  <a:txBody>
+                    <a:bodyPr/>
+                    <a:lstStyle/>
+                    <a:p>
+                      <a:pPr algn="r"/>
+                      <a:r>
+                        <a:rPr lang="ru-RU" sz="1400" dirty="0"/>
+                        <a:t>10000</a:t>
+                      </a:r>
+                      <a:endParaRPr lang="uk-UA" sz="1400" dirty="0"/>
+                    </a:p>
+                  </a:txBody>
+                  <a:tcPr/>
+                </a:tc>
+                <a:tc>
+                  <a:txBody>
+                    <a:bodyPr/>
+                    <a:lstStyle/>
+                    <a:p>
+                      <a:pPr algn="r"/>
+                      <a:r>
+                        <a:rPr lang="ru-RU" sz="1400" dirty="0"/>
+                        <a:t>715</a:t>
+                      </a:r>
+                      <a:endParaRPr lang="uk-UA" sz="1400" dirty="0"/>
+                    </a:p>
+                  </a:txBody>
+                  <a:tcPr/>
+                </a:tc>
+                <a:tc>
+                  <a:txBody>
+                    <a:bodyPr/>
+                    <a:lstStyle/>
+                    <a:p>
+                      <a:pPr algn="r"/>
+                      <a:r>
+                        <a:rPr lang="ru-RU" sz="1400" dirty="0"/>
+                        <a:t>457</a:t>
+                      </a:r>
+                      <a:endParaRPr lang="uk-UA" sz="1400" dirty="0"/>
+                    </a:p>
+                  </a:txBody>
+                  <a:tcPr/>
+                </a:tc>
+                <a:tc>
+                  <a:txBody>
+                    <a:bodyPr/>
+                    <a:lstStyle/>
+                    <a:p>
+                      <a:pPr algn="r"/>
+                      <a:r>
+                        <a:rPr lang="ru-RU" sz="1400" dirty="0"/>
+                        <a:t>470</a:t>
+                      </a:r>
+                      <a:endParaRPr lang="uk-UA" sz="1400" dirty="0"/>
+                    </a:p>
+                  </a:txBody>
+                  <a:tcPr/>
+                </a:tc>
+                <a:extLst>
+                  <a:ext uri="{0D108BD9-81ED-4DB2-BD59-A6C34878D82A}">
+                    <a16:rowId xmlns:a16="http://schemas.microsoft.com/office/drawing/2014/main" val="3231497205"/>
+                  </a:ext>
+                </a:extLst>
+              </a:tr>
+              <a:tr h="408672">
+                <a:tc>
+                  <a:txBody>
+                    <a:bodyPr/>
+                    <a:lstStyle/>
+                    <a:p>
+                      <a:pPr algn="r"/>
+                      <a:r>
+                        <a:rPr lang="ru-RU" sz="1400" dirty="0"/>
+                        <a:t>50000</a:t>
+                      </a:r>
+                      <a:endParaRPr lang="uk-UA" sz="1400" dirty="0"/>
+                    </a:p>
+                  </a:txBody>
+                  <a:tcPr/>
+                </a:tc>
+                <a:tc>
+                  <a:txBody>
+                    <a:bodyPr/>
+                    <a:lstStyle/>
+                    <a:p>
+                      <a:pPr algn="r"/>
+                      <a:r>
+                        <a:rPr lang="ru-RU" sz="1400" dirty="0"/>
+                        <a:t>2136</a:t>
+                      </a:r>
+                      <a:endParaRPr lang="uk-UA" sz="1400" dirty="0"/>
+                    </a:p>
+                  </a:txBody>
+                  <a:tcPr/>
+                </a:tc>
+                <a:tc>
+                  <a:txBody>
+                    <a:bodyPr/>
+                    <a:lstStyle/>
+                    <a:p>
+                      <a:pPr algn="r"/>
+                      <a:r>
+                        <a:rPr lang="ru-RU" sz="1400" dirty="0"/>
+                        <a:t>440</a:t>
+                      </a:r>
+                      <a:endParaRPr lang="uk-UA" sz="1400" dirty="0"/>
+                    </a:p>
+                  </a:txBody>
+                  <a:tcPr/>
+                </a:tc>
+                <a:tc>
+                  <a:txBody>
+                    <a:bodyPr/>
+                    <a:lstStyle/>
+                    <a:p>
+                      <a:pPr algn="r"/>
+                      <a:r>
+                        <a:rPr lang="ru-RU" sz="1400" dirty="0"/>
+                        <a:t>445</a:t>
+                      </a:r>
+                      <a:endParaRPr lang="uk-UA" sz="1400" dirty="0"/>
+                    </a:p>
+                  </a:txBody>
+                  <a:tcPr/>
+                </a:tc>
+                <a:extLst>
+                  <a:ext uri="{0D108BD9-81ED-4DB2-BD59-A6C34878D82A}">
+                    <a16:rowId xmlns:a16="http://schemas.microsoft.com/office/drawing/2014/main" val="37649387"/>
+                  </a:ext>
+                </a:extLst>
+              </a:tr>
+              <a:tr h="408672">
+                <a:tc>
+                  <a:txBody>
+                    <a:bodyPr/>
+                    <a:lstStyle/>
+                    <a:p>
+                      <a:pPr algn="r"/>
+                      <a:r>
+                        <a:rPr lang="ru-RU" sz="1400" dirty="0"/>
+                        <a:t>100000</a:t>
+                      </a:r>
+                      <a:endParaRPr lang="uk-UA" sz="1400" dirty="0"/>
+                    </a:p>
+                  </a:txBody>
+                  <a:tcPr/>
+                </a:tc>
+                <a:tc>
+                  <a:txBody>
+                    <a:bodyPr/>
+                    <a:lstStyle/>
+                    <a:p>
+                      <a:pPr algn="r"/>
+                      <a:r>
+                        <a:rPr lang="ru-RU" sz="1400" dirty="0"/>
+                        <a:t>5978</a:t>
+                      </a:r>
+                      <a:endParaRPr lang="uk-UA" sz="1400" dirty="0"/>
+                    </a:p>
+                  </a:txBody>
+                  <a:tcPr/>
+                </a:tc>
+                <a:tc>
+                  <a:txBody>
+                    <a:bodyPr/>
+                    <a:lstStyle/>
+                    <a:p>
+                      <a:pPr algn="r"/>
+                      <a:r>
+                        <a:rPr lang="ru-RU" sz="1400" dirty="0"/>
+                        <a:t>498</a:t>
+                      </a:r>
+                      <a:endParaRPr lang="uk-UA" sz="1400" dirty="0"/>
+                    </a:p>
+                  </a:txBody>
+                  <a:tcPr/>
+                </a:tc>
+                <a:tc>
+                  <a:txBody>
+                    <a:bodyPr/>
+                    <a:lstStyle/>
+                    <a:p>
+                      <a:pPr algn="r"/>
+                      <a:r>
+                        <a:rPr lang="ru-RU" sz="1400" dirty="0"/>
+                        <a:t>510</a:t>
+                      </a:r>
+                      <a:endParaRPr lang="uk-UA" sz="1400" dirty="0"/>
+                    </a:p>
+                  </a:txBody>
+                  <a:tcPr/>
+                </a:tc>
+                <a:extLst>
+                  <a:ext uri="{0D108BD9-81ED-4DB2-BD59-A6C34878D82A}">
+                    <a16:rowId xmlns:a16="http://schemas.microsoft.com/office/drawing/2014/main" val="406370677"/>
+                  </a:ext>
+                </a:extLst>
+              </a:tr>
+              <a:tr h="408672">
+                <a:tc>
+                  <a:txBody>
+                    <a:bodyPr/>
+                    <a:lstStyle/>
+                    <a:p>
+                      <a:pPr algn="r"/>
+                      <a:r>
+                        <a:rPr lang="ru-RU" sz="1400" dirty="0"/>
+                        <a:t>250000</a:t>
+                      </a:r>
+                      <a:endParaRPr lang="uk-UA" sz="1400" dirty="0"/>
+                    </a:p>
+                  </a:txBody>
+                  <a:tcPr/>
+                </a:tc>
+                <a:tc>
+                  <a:txBody>
+                    <a:bodyPr/>
+                    <a:lstStyle/>
+                    <a:p>
+                      <a:pPr algn="r"/>
+                      <a:r>
+                        <a:rPr lang="ru-RU" sz="1400" dirty="0"/>
+                        <a:t>50571</a:t>
+                      </a:r>
+                      <a:endParaRPr lang="uk-UA" sz="1400" dirty="0"/>
+                    </a:p>
+                  </a:txBody>
+                  <a:tcPr/>
+                </a:tc>
+                <a:tc>
+                  <a:txBody>
+                    <a:bodyPr/>
+                    <a:lstStyle/>
+                    <a:p>
+                      <a:pPr algn="r"/>
+                      <a:r>
+                        <a:rPr lang="ru-RU" sz="1400" dirty="0"/>
+                        <a:t>524</a:t>
+                      </a:r>
+                      <a:endParaRPr lang="uk-UA" sz="1400" dirty="0"/>
+                    </a:p>
+                  </a:txBody>
+                  <a:tcPr/>
+                </a:tc>
+                <a:tc>
+                  <a:txBody>
+                    <a:bodyPr/>
+                    <a:lstStyle/>
+                    <a:p>
+                      <a:pPr algn="r"/>
+                      <a:r>
+                        <a:rPr lang="ru-RU" sz="1400" dirty="0"/>
+                        <a:t>520</a:t>
+                      </a:r>
+                      <a:endParaRPr lang="uk-UA" sz="1400" dirty="0"/>
+                    </a:p>
+                  </a:txBody>
+                  <a:tcPr/>
+                </a:tc>
+                <a:extLst>
+                  <a:ext uri="{0D108BD9-81ED-4DB2-BD59-A6C34878D82A}">
+                    <a16:rowId xmlns:a16="http://schemas.microsoft.com/office/drawing/2014/main" val="4084591450"/>
+                  </a:ext>
+                </a:extLst>
+              </a:tr>
+            </a:tbl>
+          </a:graphicData>
+        </a:graphic>
+      </p:graphicFrame>
     </p:spTree>
     <p:extLst>
       <p:ext uri="{BB962C8B-B14F-4D97-AF65-F5344CB8AC3E}">
-        <p14:creationId xmlns:p14="http://schemas.microsoft.com/office/powerpoint/2010/main" val="1693419221"/>
+        <p14:creationId xmlns:p14="http://schemas.microsoft.com/office/powerpoint/2010/main" val="2441180982"/>
       </p:ext>
     </p:extLst>
   </p:cSld>

</xml_diff>